<commit_message>
Fin du rapport powerpoint
</commit_message>
<xml_diff>
--- a/docs/Avila analysis - Presentation.pptx
+++ b/docs/Avila analysis - Presentation.pptx
@@ -5,10 +5,10 @@
     <p:sldMasterId id="2147483648" r:id="rId1"/>
   </p:sldMasterIdLst>
   <p:notesMasterIdLst>
-    <p:notesMasterId r:id="rId11"/>
+    <p:notesMasterId r:id="rId12"/>
   </p:notesMasterIdLst>
   <p:handoutMasterIdLst>
-    <p:handoutMasterId r:id="rId12"/>
+    <p:handoutMasterId r:id="rId13"/>
   </p:handoutMasterIdLst>
   <p:sldIdLst>
     <p:sldId id="256" r:id="rId2"/>
@@ -19,7 +19,8 @@
     <p:sldId id="260" r:id="rId7"/>
     <p:sldId id="261" r:id="rId8"/>
     <p:sldId id="264" r:id="rId9"/>
-    <p:sldId id="263" r:id="rId10"/>
+    <p:sldId id="267" r:id="rId10"/>
+    <p:sldId id="268" r:id="rId11"/>
   </p:sldIdLst>
   <p:sldSz cx="12192000" cy="6858000"/>
   <p:notesSz cx="6858000" cy="9144000"/>
@@ -118,6 +119,11 @@
       </a:defRPr>
     </a:lvl9pPr>
   </p:defaultTextStyle>
+  <p:extLst>
+    <p:ext uri="{EFAFB233-063F-42B5-8137-9DF3F51BA10A}">
+      <p15:sldGuideLst xmlns:p15="http://schemas.microsoft.com/office/powerpoint/2012/main"/>
+    </p:ext>
+  </p:extLst>
 </p:presentation>
 </file>
 
@@ -215,7 +221,7 @@
           <a:p>
             <a:fld id="{5D2FC9F9-B560-4F16-A0EE-3D4A46B45797}" type="datetimeFigureOut">
               <a:rPr lang="fr-FR" smtClean="0"/>
-              <a:t>08/01/2021</a:t>
+              <a:t>09/01/2021</a:t>
             </a:fld>
             <a:endParaRPr lang="fr-FR"/>
           </a:p>
@@ -392,7 +398,7 @@
           <a:p>
             <a:fld id="{24FD779D-D8E0-4482-A882-205C63081EF2}" type="datetimeFigureOut">
               <a:rPr lang="fr-FR" smtClean="0"/>
-              <a:t>08/01/2021</a:t>
+              <a:t>09/01/2021</a:t>
             </a:fld>
             <a:endParaRPr lang="fr-FR"/>
           </a:p>
@@ -806,7 +812,7 @@
           <a:p>
             <a:fld id="{9EC03500-2F75-4360-A153-7189EFABC709}" type="datetime1">
               <a:rPr lang="fr-FR" smtClean="0"/>
-              <a:t>08/01/2021</a:t>
+              <a:t>09/01/2021</a:t>
             </a:fld>
             <a:endParaRPr lang="fr-FR"/>
           </a:p>
@@ -1007,7 +1013,7 @@
           <a:p>
             <a:fld id="{E4D957AE-F7D3-4858-949E-683648FC13DB}" type="datetime1">
               <a:rPr lang="fr-FR" smtClean="0"/>
-              <a:t>08/01/2021</a:t>
+              <a:t>09/01/2021</a:t>
             </a:fld>
             <a:endParaRPr lang="fr-FR"/>
           </a:p>
@@ -1218,7 +1224,7 @@
           <a:p>
             <a:fld id="{19D4430A-4D43-43F9-9312-91A054884B72}" type="datetime1">
               <a:rPr lang="fr-FR" smtClean="0"/>
-              <a:t>08/01/2021</a:t>
+              <a:t>09/01/2021</a:t>
             </a:fld>
             <a:endParaRPr lang="fr-FR"/>
           </a:p>
@@ -1419,7 +1425,7 @@
           <a:p>
             <a:fld id="{6FE543F3-2DF2-4DB2-8527-E58816D11189}" type="datetime1">
               <a:rPr lang="fr-FR" smtClean="0"/>
-              <a:t>08/01/2021</a:t>
+              <a:t>09/01/2021</a:t>
             </a:fld>
             <a:endParaRPr lang="fr-FR"/>
           </a:p>
@@ -1697,7 +1703,7 @@
           <a:p>
             <a:fld id="{D8E51526-D260-4825-9AAA-686F2E29DA08}" type="datetime1">
               <a:rPr lang="fr-FR" smtClean="0"/>
-              <a:t>08/01/2021</a:t>
+              <a:t>09/01/2021</a:t>
             </a:fld>
             <a:endParaRPr lang="fr-FR"/>
           </a:p>
@@ -1965,7 +1971,7 @@
           <a:p>
             <a:fld id="{0674C72F-6096-425A-B46C-8F0607362D6A}" type="datetime1">
               <a:rPr lang="fr-FR" smtClean="0"/>
-              <a:t>08/01/2021</a:t>
+              <a:t>09/01/2021</a:t>
             </a:fld>
             <a:endParaRPr lang="fr-FR"/>
           </a:p>
@@ -2380,7 +2386,7 @@
           <a:p>
             <a:fld id="{52D73F33-419E-486C-BB63-F73DCC736D27}" type="datetime1">
               <a:rPr lang="fr-FR" smtClean="0"/>
-              <a:t>08/01/2021</a:t>
+              <a:t>09/01/2021</a:t>
             </a:fld>
             <a:endParaRPr lang="fr-FR"/>
           </a:p>
@@ -2524,7 +2530,7 @@
           <a:p>
             <a:fld id="{923DBE9A-DB77-43E1-AE98-37931C514BBF}" type="datetime1">
               <a:rPr lang="fr-FR" smtClean="0"/>
-              <a:t>08/01/2021</a:t>
+              <a:t>09/01/2021</a:t>
             </a:fld>
             <a:endParaRPr lang="fr-FR"/>
           </a:p>
@@ -2640,7 +2646,7 @@
           <a:p>
             <a:fld id="{947EEBA3-6A38-49B7-80D1-805CFF4AAC45}" type="datetime1">
               <a:rPr lang="fr-FR" smtClean="0"/>
-              <a:t>08/01/2021</a:t>
+              <a:t>09/01/2021</a:t>
             </a:fld>
             <a:endParaRPr lang="fr-FR"/>
           </a:p>
@@ -2954,7 +2960,7 @@
           <a:p>
             <a:fld id="{A58D1C19-5101-4B6D-9AE8-0138A62B23FB}" type="datetime1">
               <a:rPr lang="fr-FR" smtClean="0"/>
-              <a:t>08/01/2021</a:t>
+              <a:t>09/01/2021</a:t>
             </a:fld>
             <a:endParaRPr lang="fr-FR"/>
           </a:p>
@@ -3245,7 +3251,7 @@
           <a:p>
             <a:fld id="{6673E1B8-CF58-4EE4-822C-FF8985DCD937}" type="datetime1">
               <a:rPr lang="fr-FR" smtClean="0"/>
-              <a:t>08/01/2021</a:t>
+              <a:t>09/01/2021</a:t>
             </a:fld>
             <a:endParaRPr lang="fr-FR"/>
           </a:p>
@@ -3489,7 +3495,7 @@
           <a:p>
             <a:fld id="{9B265E48-FBFA-4FCA-8565-6DD87B9E95D9}" type="datetime1">
               <a:rPr lang="fr-FR" smtClean="0"/>
-              <a:t>08/01/2021</a:t>
+              <a:t>09/01/2021</a:t>
             </a:fld>
             <a:endParaRPr lang="fr-FR"/>
           </a:p>
@@ -4593,6 +4599,415 @@
     <p:extLst>
       <p:ext uri="{BB962C8B-B14F-4D97-AF65-F5344CB8AC3E}">
         <p14:creationId xmlns:p14="http://schemas.microsoft.com/office/powerpoint/2010/main" val="883950103"/>
+      </p:ext>
+    </p:extLst>
+  </p:cSld>
+  <p:clrMapOvr>
+    <a:masterClrMapping/>
+  </p:clrMapOvr>
+  <p:transition>
+    <p:push dir="u"/>
+  </p:transition>
+</p:sld>
+</file>
+
+<file path=ppt/slides/slide10.xml><?xml version="1.0" encoding="utf-8"?>
+<p:sld xmlns:a="http://schemas.openxmlformats.org/drawingml/2006/main" xmlns:r="http://schemas.openxmlformats.org/officeDocument/2006/relationships" xmlns:p="http://schemas.openxmlformats.org/presentationml/2006/main">
+  <p:cSld>
+    <p:spTree>
+      <p:nvGrpSpPr>
+        <p:cNvPr id="1" name=""/>
+        <p:cNvGrpSpPr/>
+        <p:nvPr/>
+      </p:nvGrpSpPr>
+      <p:grpSpPr>
+        <a:xfrm>
+          <a:off x="0" y="0"/>
+          <a:ext cx="0" cy="0"/>
+          <a:chOff x="0" y="0"/>
+          <a:chExt cx="0" cy="0"/>
+        </a:xfrm>
+      </p:grpSpPr>
+      <p:sp>
+        <p:nvSpPr>
+          <p:cNvPr id="4" name="Espace réservé du pied de page 3">
+            <a:extLst>
+              <a:ext uri="{FF2B5EF4-FFF2-40B4-BE49-F238E27FC236}">
+                <a16:creationId xmlns:a16="http://schemas.microsoft.com/office/drawing/2014/main" id="{3CB0DDB0-9E26-48DD-B0E2-5DF0BD3B6932}"/>
+              </a:ext>
+            </a:extLst>
+          </p:cNvPr>
+          <p:cNvSpPr>
+            <a:spLocks noGrp="1"/>
+          </p:cNvSpPr>
+          <p:nvPr>
+            <p:ph type="ftr" sz="quarter" idx="11"/>
+          </p:nvPr>
+        </p:nvSpPr>
+        <p:spPr/>
+        <p:txBody>
+          <a:bodyPr/>
+          <a:lstStyle/>
+          <a:p>
+            <a:r>
+              <a:rPr lang="fr-FR"/>
+              <a:t>ESIL - 2020/2021</a:t>
+            </a:r>
+          </a:p>
+        </p:txBody>
+      </p:sp>
+      <p:sp>
+        <p:nvSpPr>
+          <p:cNvPr id="5" name="Espace réservé du numéro de diapositive 4">
+            <a:extLst>
+              <a:ext uri="{FF2B5EF4-FFF2-40B4-BE49-F238E27FC236}">
+                <a16:creationId xmlns:a16="http://schemas.microsoft.com/office/drawing/2014/main" id="{3E5A12C2-1985-40AF-8DB9-3AB183CD60C5}"/>
+              </a:ext>
+            </a:extLst>
+          </p:cNvPr>
+          <p:cNvSpPr>
+            <a:spLocks noGrp="1"/>
+          </p:cNvSpPr>
+          <p:nvPr>
+            <p:ph type="sldNum" sz="quarter" idx="12"/>
+          </p:nvPr>
+        </p:nvSpPr>
+        <p:spPr/>
+        <p:txBody>
+          <a:bodyPr/>
+          <a:lstStyle/>
+          <a:p>
+            <a:fld id="{DD5B75F3-C744-4612-BF47-86573985E5E8}" type="slidenum">
+              <a:rPr lang="fr-FR" smtClean="0"/>
+              <a:t>10</a:t>
+            </a:fld>
+            <a:endParaRPr lang="fr-FR"/>
+          </a:p>
+        </p:txBody>
+      </p:sp>
+      <p:sp>
+        <p:nvSpPr>
+          <p:cNvPr id="6" name="Sous-titre 2">
+            <a:extLst>
+              <a:ext uri="{FF2B5EF4-FFF2-40B4-BE49-F238E27FC236}">
+                <a16:creationId xmlns:a16="http://schemas.microsoft.com/office/drawing/2014/main" id="{20BB4F68-A7BB-4208-BB15-B285D1FC825D}"/>
+              </a:ext>
+            </a:extLst>
+          </p:cNvPr>
+          <p:cNvSpPr txBox="1">
+            <a:spLocks/>
+          </p:cNvSpPr>
+          <p:nvPr/>
+        </p:nvSpPr>
+        <p:spPr>
+          <a:xfrm>
+            <a:off x="838200" y="781460"/>
+            <a:ext cx="10377529" cy="5019572"/>
+          </a:xfrm>
+          <a:prstGeom prst="rect">
+            <a:avLst/>
+          </a:prstGeom>
+        </p:spPr>
+        <p:txBody>
+          <a:bodyPr vert="horz" lIns="91440" tIns="45720" rIns="91440" bIns="45720" rtlCol="0">
+            <a:normAutofit/>
+          </a:bodyPr>
+          <a:lstStyle>
+            <a:lvl1pPr marL="228600" indent="-228600" algn="l" defTabSz="914400" rtl="0" eaLnBrk="1" latinLnBrk="0" hangingPunct="1">
+              <a:lnSpc>
+                <a:spcPct val="90000"/>
+              </a:lnSpc>
+              <a:spcBef>
+                <a:spcPts val="1000"/>
+              </a:spcBef>
+              <a:buFont typeface="Arial" panose="020B0604020202020204" pitchFamily="34" charset="0"/>
+              <a:buChar char="•"/>
+              <a:defRPr sz="2800" kern="1200">
+                <a:solidFill>
+                  <a:schemeClr val="tx1"/>
+                </a:solidFill>
+                <a:latin typeface="+mn-lt"/>
+                <a:ea typeface="+mn-ea"/>
+                <a:cs typeface="+mn-cs"/>
+              </a:defRPr>
+            </a:lvl1pPr>
+            <a:lvl2pPr marL="685800" indent="-228600" algn="l" defTabSz="914400" rtl="0" eaLnBrk="1" latinLnBrk="0" hangingPunct="1">
+              <a:lnSpc>
+                <a:spcPct val="90000"/>
+              </a:lnSpc>
+              <a:spcBef>
+                <a:spcPts val="500"/>
+              </a:spcBef>
+              <a:buFont typeface="Arial" panose="020B0604020202020204" pitchFamily="34" charset="0"/>
+              <a:buChar char="•"/>
+              <a:defRPr sz="2400" kern="1200">
+                <a:solidFill>
+                  <a:schemeClr val="tx1"/>
+                </a:solidFill>
+                <a:latin typeface="+mn-lt"/>
+                <a:ea typeface="+mn-ea"/>
+                <a:cs typeface="+mn-cs"/>
+              </a:defRPr>
+            </a:lvl2pPr>
+            <a:lvl3pPr marL="1143000" indent="-228600" algn="l" defTabSz="914400" rtl="0" eaLnBrk="1" latinLnBrk="0" hangingPunct="1">
+              <a:lnSpc>
+                <a:spcPct val="90000"/>
+              </a:lnSpc>
+              <a:spcBef>
+                <a:spcPts val="500"/>
+              </a:spcBef>
+              <a:buFont typeface="Arial" panose="020B0604020202020204" pitchFamily="34" charset="0"/>
+              <a:buChar char="•"/>
+              <a:defRPr sz="2000" kern="1200">
+                <a:solidFill>
+                  <a:schemeClr val="tx1"/>
+                </a:solidFill>
+                <a:latin typeface="+mn-lt"/>
+                <a:ea typeface="+mn-ea"/>
+                <a:cs typeface="+mn-cs"/>
+              </a:defRPr>
+            </a:lvl3pPr>
+            <a:lvl4pPr marL="1600200" indent="-228600" algn="l" defTabSz="914400" rtl="0" eaLnBrk="1" latinLnBrk="0" hangingPunct="1">
+              <a:lnSpc>
+                <a:spcPct val="90000"/>
+              </a:lnSpc>
+              <a:spcBef>
+                <a:spcPts val="500"/>
+              </a:spcBef>
+              <a:buFont typeface="Arial" panose="020B0604020202020204" pitchFamily="34" charset="0"/>
+              <a:buChar char="•"/>
+              <a:defRPr sz="1800" kern="1200">
+                <a:solidFill>
+                  <a:schemeClr val="tx1"/>
+                </a:solidFill>
+                <a:latin typeface="+mn-lt"/>
+                <a:ea typeface="+mn-ea"/>
+                <a:cs typeface="+mn-cs"/>
+              </a:defRPr>
+            </a:lvl4pPr>
+            <a:lvl5pPr marL="2057400" indent="-228600" algn="l" defTabSz="914400" rtl="0" eaLnBrk="1" latinLnBrk="0" hangingPunct="1">
+              <a:lnSpc>
+                <a:spcPct val="90000"/>
+              </a:lnSpc>
+              <a:spcBef>
+                <a:spcPts val="500"/>
+              </a:spcBef>
+              <a:buFont typeface="Arial" panose="020B0604020202020204" pitchFamily="34" charset="0"/>
+              <a:buChar char="•"/>
+              <a:defRPr sz="1800" kern="1200">
+                <a:solidFill>
+                  <a:schemeClr val="tx1"/>
+                </a:solidFill>
+                <a:latin typeface="+mn-lt"/>
+                <a:ea typeface="+mn-ea"/>
+                <a:cs typeface="+mn-cs"/>
+              </a:defRPr>
+            </a:lvl5pPr>
+            <a:lvl6pPr marL="2514600" indent="-228600" algn="l" defTabSz="914400" rtl="0" eaLnBrk="1" latinLnBrk="0" hangingPunct="1">
+              <a:lnSpc>
+                <a:spcPct val="90000"/>
+              </a:lnSpc>
+              <a:spcBef>
+                <a:spcPts val="500"/>
+              </a:spcBef>
+              <a:buFont typeface="Arial" panose="020B0604020202020204" pitchFamily="34" charset="0"/>
+              <a:buChar char="•"/>
+              <a:defRPr sz="1800" kern="1200">
+                <a:solidFill>
+                  <a:schemeClr val="tx1"/>
+                </a:solidFill>
+                <a:latin typeface="+mn-lt"/>
+                <a:ea typeface="+mn-ea"/>
+                <a:cs typeface="+mn-cs"/>
+              </a:defRPr>
+            </a:lvl6pPr>
+            <a:lvl7pPr marL="2971800" indent="-228600" algn="l" defTabSz="914400" rtl="0" eaLnBrk="1" latinLnBrk="0" hangingPunct="1">
+              <a:lnSpc>
+                <a:spcPct val="90000"/>
+              </a:lnSpc>
+              <a:spcBef>
+                <a:spcPts val="500"/>
+              </a:spcBef>
+              <a:buFont typeface="Arial" panose="020B0604020202020204" pitchFamily="34" charset="0"/>
+              <a:buChar char="•"/>
+              <a:defRPr sz="1800" kern="1200">
+                <a:solidFill>
+                  <a:schemeClr val="tx1"/>
+                </a:solidFill>
+                <a:latin typeface="+mn-lt"/>
+                <a:ea typeface="+mn-ea"/>
+                <a:cs typeface="+mn-cs"/>
+              </a:defRPr>
+            </a:lvl7pPr>
+            <a:lvl8pPr marL="3429000" indent="-228600" algn="l" defTabSz="914400" rtl="0" eaLnBrk="1" latinLnBrk="0" hangingPunct="1">
+              <a:lnSpc>
+                <a:spcPct val="90000"/>
+              </a:lnSpc>
+              <a:spcBef>
+                <a:spcPts val="500"/>
+              </a:spcBef>
+              <a:buFont typeface="Arial" panose="020B0604020202020204" pitchFamily="34" charset="0"/>
+              <a:buChar char="•"/>
+              <a:defRPr sz="1800" kern="1200">
+                <a:solidFill>
+                  <a:schemeClr val="tx1"/>
+                </a:solidFill>
+                <a:latin typeface="+mn-lt"/>
+                <a:ea typeface="+mn-ea"/>
+                <a:cs typeface="+mn-cs"/>
+              </a:defRPr>
+            </a:lvl8pPr>
+            <a:lvl9pPr marL="3886200" indent="-228600" algn="l" defTabSz="914400" rtl="0" eaLnBrk="1" latinLnBrk="0" hangingPunct="1">
+              <a:lnSpc>
+                <a:spcPct val="90000"/>
+              </a:lnSpc>
+              <a:spcBef>
+                <a:spcPts val="500"/>
+              </a:spcBef>
+              <a:buFont typeface="Arial" panose="020B0604020202020204" pitchFamily="34" charset="0"/>
+              <a:buChar char="•"/>
+              <a:defRPr sz="1800" kern="1200">
+                <a:solidFill>
+                  <a:schemeClr val="tx1"/>
+                </a:solidFill>
+                <a:latin typeface="+mn-lt"/>
+                <a:ea typeface="+mn-ea"/>
+                <a:cs typeface="+mn-cs"/>
+              </a:defRPr>
+            </a:lvl9pPr>
+          </a:lstStyle>
+          <a:p>
+            <a:pPr>
+              <a:lnSpc>
+                <a:spcPct val="100000"/>
+              </a:lnSpc>
+            </a:pPr>
+            <a:r>
+              <a:rPr lang="fr-FR" sz="2400" dirty="0">
+                <a:solidFill>
+                  <a:schemeClr val="accent2"/>
+                </a:solidFill>
+                <a:latin typeface="SF Pro Text" panose="00000500000000000000" pitchFamily="2" charset="0"/>
+                <a:ea typeface="SF Pro Text" panose="00000500000000000000" pitchFamily="2" charset="0"/>
+              </a:rPr>
+              <a:t>Phase de comparaison</a:t>
+            </a:r>
+            <a:r>
+              <a:rPr lang="fr-FR" sz="2400" dirty="0">
+                <a:solidFill>
+                  <a:schemeClr val="tx1">
+                    <a:lumMod val="65000"/>
+                    <a:lumOff val="35000"/>
+                  </a:schemeClr>
+                </a:solidFill>
+                <a:latin typeface="SF Pro Text" panose="00000500000000000000" pitchFamily="2" charset="0"/>
+                <a:ea typeface="SF Pro Text" panose="00000500000000000000" pitchFamily="2" charset="0"/>
+              </a:rPr>
+              <a:t> :</a:t>
+            </a:r>
+          </a:p>
+          <a:p>
+            <a:pPr marL="0" indent="0">
+              <a:lnSpc>
+                <a:spcPct val="100000"/>
+              </a:lnSpc>
+              <a:buNone/>
+            </a:pPr>
+            <a:r>
+              <a:rPr lang="fr-FR" sz="2400" dirty="0">
+                <a:solidFill>
+                  <a:schemeClr val="tx1">
+                    <a:lumMod val="65000"/>
+                    <a:lumOff val="35000"/>
+                  </a:schemeClr>
+                </a:solidFill>
+                <a:latin typeface="SF Pro Text" panose="00000500000000000000" pitchFamily="2" charset="0"/>
+                <a:ea typeface="SF Pro Text" panose="00000500000000000000" pitchFamily="2" charset="0"/>
+              </a:rPr>
+              <a:t>Lorsque l’on a trouvé les meilleurs paramètres associés à chaque modèle nous effectuons un dernier test de comparaison de score afin de récupérer le meilleur modèle.</a:t>
+            </a:r>
+          </a:p>
+          <a:p>
+            <a:pPr marL="0" indent="0">
+              <a:lnSpc>
+                <a:spcPct val="100000"/>
+              </a:lnSpc>
+              <a:buNone/>
+            </a:pPr>
+            <a:r>
+              <a:rPr lang="fr-FR" sz="2400" dirty="0">
+                <a:solidFill>
+                  <a:schemeClr val="tx1">
+                    <a:lumMod val="65000"/>
+                    <a:lumOff val="35000"/>
+                  </a:schemeClr>
+                </a:solidFill>
+                <a:latin typeface="SF Pro Text" panose="00000500000000000000" pitchFamily="2" charset="0"/>
+                <a:ea typeface="SF Pro Text" panose="00000500000000000000" pitchFamily="2" charset="0"/>
+              </a:rPr>
+              <a:t>Nous avons ainsi identifié « </a:t>
+            </a:r>
+            <a:r>
+              <a:rPr lang="en-GB" sz="2400" dirty="0">
+                <a:solidFill>
+                  <a:schemeClr val="accent5"/>
+                </a:solidFill>
+                <a:latin typeface="SF Pro Text" panose="00000500000000000000" pitchFamily="2" charset="0"/>
+                <a:ea typeface="SF Pro Text" panose="00000500000000000000" pitchFamily="2" charset="0"/>
+              </a:rPr>
+              <a:t>Random forest</a:t>
+            </a:r>
+            <a:r>
+              <a:rPr lang="en-GB" sz="2400" dirty="0">
+                <a:solidFill>
+                  <a:schemeClr val="tx1">
+                    <a:lumMod val="65000"/>
+                    <a:lumOff val="35000"/>
+                  </a:schemeClr>
+                </a:solidFill>
+                <a:latin typeface="SF Pro Text" panose="00000500000000000000" pitchFamily="2" charset="0"/>
+                <a:ea typeface="SF Pro Text" panose="00000500000000000000" pitchFamily="2" charset="0"/>
+              </a:rPr>
+              <a:t> </a:t>
+            </a:r>
+            <a:r>
+              <a:rPr lang="fr-FR" sz="2400" dirty="0">
+                <a:solidFill>
+                  <a:schemeClr val="tx1">
+                    <a:lumMod val="65000"/>
+                    <a:lumOff val="35000"/>
+                  </a:schemeClr>
+                </a:solidFill>
+                <a:latin typeface="SF Pro Text" panose="00000500000000000000" pitchFamily="2" charset="0"/>
+                <a:ea typeface="SF Pro Text" panose="00000500000000000000" pitchFamily="2" charset="0"/>
+              </a:rPr>
+              <a:t>» comme étant le plus performant pour la classification de l’ensemble des données d’Avila.</a:t>
+            </a:r>
+          </a:p>
+          <a:p>
+            <a:pPr marL="0" indent="0">
+              <a:lnSpc>
+                <a:spcPct val="100000"/>
+              </a:lnSpc>
+              <a:buNone/>
+            </a:pPr>
+            <a:endParaRPr lang="fr-FR" sz="2400" dirty="0">
+              <a:solidFill>
+                <a:schemeClr val="tx1">
+                  <a:lumMod val="65000"/>
+                  <a:lumOff val="35000"/>
+                </a:schemeClr>
+              </a:solidFill>
+              <a:latin typeface="SF Pro Text" panose="00000500000000000000" pitchFamily="2" charset="0"/>
+              <a:ea typeface="SF Pro Text" panose="00000500000000000000" pitchFamily="2" charset="0"/>
+            </a:endParaRPr>
+          </a:p>
+        </p:txBody>
+      </p:sp>
+    </p:spTree>
+    <p:extLst>
+      <p:ext uri="{BB962C8B-B14F-4D97-AF65-F5344CB8AC3E}">
+        <p14:creationId xmlns:p14="http://schemas.microsoft.com/office/powerpoint/2010/main" val="1926809293"/>
       </p:ext>
     </p:extLst>
   </p:cSld>
@@ -6206,7 +6621,7 @@
                 <a:latin typeface="SF Pro Text" panose="00000500000000000000" pitchFamily="2" charset="0"/>
                 <a:ea typeface="SF Pro Text" panose="00000500000000000000" pitchFamily="2" charset="0"/>
               </a:rPr>
-              <a:t> de 800 images de la « Bible d'Avila ».</a:t>
+              <a:t> de 800 images de la « Bible d'Avila ». </a:t>
             </a:r>
           </a:p>
         </p:txBody>
@@ -6225,14 +6640,17 @@
         </p:nvSpPr>
         <p:spPr>
           <a:xfrm rot="10800000">
-            <a:off x="10710594" y="-1061378"/>
+            <a:off x="10994097" y="436745"/>
             <a:ext cx="2395806" cy="2395806"/>
           </a:xfrm>
           <a:prstGeom prst="arc">
-            <a:avLst/>
+            <a:avLst>
+              <a:gd name="adj1" fmla="val 16200000"/>
+              <a:gd name="adj2" fmla="val 14533293"/>
+            </a:avLst>
           </a:prstGeom>
           <a:noFill/>
-          <a:ln w="76200" cap="rnd">
+          <a:ln w="127000" cap="rnd">
             <a:solidFill>
               <a:schemeClr val="accent4"/>
             </a:solidFill>
@@ -6325,7 +6743,7 @@
         <p:spPr>
           <a:xfrm>
             <a:off x="860742" y="4222896"/>
-            <a:ext cx="8526449" cy="830997"/>
+            <a:ext cx="8526449" cy="1200329"/>
           </a:xfrm>
           <a:prstGeom prst="rect">
             <a:avLst/>
@@ -6349,7 +6767,7 @@
                 <a:latin typeface="SF Pro Text" panose="00000500000000000000" pitchFamily="2" charset="0"/>
                 <a:ea typeface="SF Pro Text" panose="00000500000000000000" pitchFamily="2" charset="0"/>
               </a:rPr>
-              <a:t>Elle regroupe les </a:t>
+              <a:t>Elle se présente sous forme de tableau regroupant les </a:t>
             </a:r>
             <a:r>
               <a:rPr lang="fr-FR" sz="2400" dirty="0">
@@ -7172,6 +7590,9 @@
   <p:clrMapOvr>
     <a:masterClrMapping/>
   </p:clrMapOvr>
+  <p:transition>
+    <p:push dir="u"/>
+  </p:transition>
 </p:sld>
 </file>
 
@@ -7264,7 +7685,7 @@
         <p:spPr>
           <a:xfrm>
             <a:off x="815424" y="797510"/>
-            <a:ext cx="10538375" cy="461665"/>
+            <a:ext cx="10538375" cy="830997"/>
           </a:xfrm>
           <a:prstGeom prst="rect">
             <a:avLst/>
@@ -7288,15 +7709,987 @@
                 <a:latin typeface="SF Pro Text" panose="00000500000000000000" pitchFamily="2" charset="0"/>
                 <a:ea typeface="SF Pro Text" panose="00000500000000000000" pitchFamily="2" charset="0"/>
               </a:rPr>
-              <a:t>La colonne classe :</a:t>
-            </a:r>
-            <a:endParaRPr lang="fr-FR" sz="2400" dirty="0">
-              <a:solidFill>
-                <a:schemeClr val="accent5"/>
-              </a:solidFill>
-              <a:latin typeface="SF Pro Text" panose="00000500000000000000" pitchFamily="2" charset="0"/>
-              <a:ea typeface="SF Pro Text" panose="00000500000000000000" pitchFamily="2" charset="0"/>
-            </a:endParaRPr>
+              <a:t>Dans l’ensemble des données on y distingue 12 copistes représenté par des labels : </a:t>
+            </a:r>
+            <a:r>
+              <a:rPr lang="fr-FR" sz="2400" dirty="0">
+                <a:solidFill>
+                  <a:schemeClr val="accent5"/>
+                </a:solidFill>
+                <a:latin typeface="SF Pro Text" panose="00000500000000000000" pitchFamily="2" charset="0"/>
+                <a:ea typeface="SF Pro Text" panose="00000500000000000000" pitchFamily="2" charset="0"/>
+              </a:rPr>
+              <a:t>A, B, C, D, E, F, G, H, I, W, X et Y</a:t>
+            </a:r>
+          </a:p>
+        </p:txBody>
+      </p:sp>
+      <p:sp>
+        <p:nvSpPr>
+          <p:cNvPr id="7" name="ZoneTexte 6">
+            <a:extLst>
+              <a:ext uri="{FF2B5EF4-FFF2-40B4-BE49-F238E27FC236}">
+                <a16:creationId xmlns:a16="http://schemas.microsoft.com/office/drawing/2014/main" id="{F1A8AB4C-66B9-4BBB-AFC0-32150059E30A}"/>
+              </a:ext>
+            </a:extLst>
+          </p:cNvPr>
+          <p:cNvSpPr txBox="1"/>
+          <p:nvPr/>
+        </p:nvSpPr>
+        <p:spPr>
+          <a:xfrm>
+            <a:off x="815423" y="1903639"/>
+            <a:ext cx="10538375" cy="830997"/>
+          </a:xfrm>
+          <a:prstGeom prst="rect">
+            <a:avLst/>
+          </a:prstGeom>
+          <a:noFill/>
+        </p:spPr>
+        <p:txBody>
+          <a:bodyPr wrap="square" rtlCol="0">
+            <a:spAutoFit/>
+          </a:bodyPr>
+          <a:lstStyle/>
+          <a:p>
+            <a:r>
+              <a:rPr lang="fr-FR" sz="2400" dirty="0">
+                <a:solidFill>
+                  <a:schemeClr val="tx1">
+                    <a:lumMod val="65000"/>
+                    <a:lumOff val="35000"/>
+                  </a:schemeClr>
+                </a:solidFill>
+                <a:latin typeface="SF Pro Text" panose="00000500000000000000" pitchFamily="2" charset="0"/>
+                <a:ea typeface="SF Pro Text" panose="00000500000000000000" pitchFamily="2" charset="0"/>
+              </a:rPr>
+              <a:t>Et les valeurs inscrite dans l’ensemble des données sont normalisé par une </a:t>
+            </a:r>
+            <a:r>
+              <a:rPr lang="en-GB" sz="2400" dirty="0">
+                <a:solidFill>
+                  <a:schemeClr val="accent2"/>
+                </a:solidFill>
+                <a:latin typeface="SF Pro Text" panose="00000500000000000000" pitchFamily="2" charset="0"/>
+                <a:ea typeface="SF Pro Text" panose="00000500000000000000" pitchFamily="2" charset="0"/>
+              </a:rPr>
+              <a:t>Z-normalization</a:t>
+            </a:r>
+          </a:p>
+        </p:txBody>
+      </p:sp>
+      <p:grpSp>
+        <p:nvGrpSpPr>
+          <p:cNvPr id="8" name="Groupe 7">
+            <a:extLst>
+              <a:ext uri="{FF2B5EF4-FFF2-40B4-BE49-F238E27FC236}">
+                <a16:creationId xmlns:a16="http://schemas.microsoft.com/office/drawing/2014/main" id="{F2BD72E1-4CA2-4A0C-A0A7-91750491832B}"/>
+              </a:ext>
+            </a:extLst>
+          </p:cNvPr>
+          <p:cNvGrpSpPr/>
+          <p:nvPr/>
+        </p:nvGrpSpPr>
+        <p:grpSpPr>
+          <a:xfrm>
+            <a:off x="5914674" y="4501581"/>
+            <a:ext cx="4934652" cy="3925846"/>
+            <a:chOff x="1094232" y="3783136"/>
+            <a:chExt cx="2070536" cy="1647250"/>
+          </a:xfrm>
+        </p:grpSpPr>
+        <p:sp>
+          <p:nvSpPr>
+            <p:cNvPr id="9" name="Ellipse 8">
+              <a:extLst>
+                <a:ext uri="{FF2B5EF4-FFF2-40B4-BE49-F238E27FC236}">
+                  <a16:creationId xmlns:a16="http://schemas.microsoft.com/office/drawing/2014/main" id="{20B4D781-E551-4BF9-B181-EC7C394F3619}"/>
+                </a:ext>
+              </a:extLst>
+            </p:cNvPr>
+            <p:cNvSpPr/>
+            <p:nvPr/>
+          </p:nvSpPr>
+          <p:spPr>
+            <a:xfrm>
+              <a:off x="1094232" y="3783136"/>
+              <a:ext cx="271272" cy="271272"/>
+            </a:xfrm>
+            <a:prstGeom prst="ellipse">
+              <a:avLst/>
+            </a:prstGeom>
+            <a:solidFill>
+              <a:schemeClr val="accent6">
+                <a:lumMod val="60000"/>
+                <a:lumOff val="40000"/>
+              </a:schemeClr>
+            </a:solidFill>
+            <a:ln w="0">
+              <a:noFill/>
+            </a:ln>
+          </p:spPr>
+          <p:style>
+            <a:lnRef idx="2">
+              <a:schemeClr val="accent1">
+                <a:shade val="50000"/>
+              </a:schemeClr>
+            </a:lnRef>
+            <a:fillRef idx="1">
+              <a:schemeClr val="accent1"/>
+            </a:fillRef>
+            <a:effectRef idx="0">
+              <a:schemeClr val="accent1"/>
+            </a:effectRef>
+            <a:fontRef idx="minor">
+              <a:schemeClr val="lt1"/>
+            </a:fontRef>
+          </p:style>
+          <p:txBody>
+            <a:bodyPr rtlCol="0" anchor="ctr"/>
+            <a:lstStyle/>
+            <a:p>
+              <a:pPr algn="ctr"/>
+              <a:endParaRPr lang="fr-FR"/>
+            </a:p>
+          </p:txBody>
+        </p:sp>
+        <p:sp>
+          <p:nvSpPr>
+            <p:cNvPr id="10" name="Ellipse 9">
+              <a:extLst>
+                <a:ext uri="{FF2B5EF4-FFF2-40B4-BE49-F238E27FC236}">
+                  <a16:creationId xmlns:a16="http://schemas.microsoft.com/office/drawing/2014/main" id="{4A145788-B516-4901-896B-37044B300509}"/>
+                </a:ext>
+              </a:extLst>
+            </p:cNvPr>
+            <p:cNvSpPr/>
+            <p:nvPr/>
+          </p:nvSpPr>
+          <p:spPr>
+            <a:xfrm>
+              <a:off x="1694740" y="3783136"/>
+              <a:ext cx="271272" cy="271272"/>
+            </a:xfrm>
+            <a:prstGeom prst="ellipse">
+              <a:avLst/>
+            </a:prstGeom>
+            <a:solidFill>
+              <a:schemeClr val="bg2"/>
+            </a:solidFill>
+            <a:ln w="0">
+              <a:noFill/>
+            </a:ln>
+          </p:spPr>
+          <p:style>
+            <a:lnRef idx="2">
+              <a:schemeClr val="accent1">
+                <a:shade val="50000"/>
+              </a:schemeClr>
+            </a:lnRef>
+            <a:fillRef idx="1">
+              <a:schemeClr val="accent1"/>
+            </a:fillRef>
+            <a:effectRef idx="0">
+              <a:schemeClr val="accent1"/>
+            </a:effectRef>
+            <a:fontRef idx="minor">
+              <a:schemeClr val="lt1"/>
+            </a:fontRef>
+          </p:style>
+          <p:txBody>
+            <a:bodyPr rtlCol="0" anchor="ctr"/>
+            <a:lstStyle/>
+            <a:p>
+              <a:pPr algn="ctr"/>
+              <a:endParaRPr lang="fr-FR" dirty="0"/>
+            </a:p>
+          </p:txBody>
+        </p:sp>
+        <p:sp>
+          <p:nvSpPr>
+            <p:cNvPr id="11" name="Ellipse 10">
+              <a:extLst>
+                <a:ext uri="{FF2B5EF4-FFF2-40B4-BE49-F238E27FC236}">
+                  <a16:creationId xmlns:a16="http://schemas.microsoft.com/office/drawing/2014/main" id="{8DADAB57-D87A-40E9-8943-7A1B3BE74689}"/>
+                </a:ext>
+              </a:extLst>
+            </p:cNvPr>
+            <p:cNvSpPr/>
+            <p:nvPr/>
+          </p:nvSpPr>
+          <p:spPr>
+            <a:xfrm>
+              <a:off x="2292988" y="3783136"/>
+              <a:ext cx="271272" cy="271272"/>
+            </a:xfrm>
+            <a:prstGeom prst="ellipse">
+              <a:avLst/>
+            </a:prstGeom>
+            <a:solidFill>
+              <a:schemeClr val="bg2"/>
+            </a:solidFill>
+            <a:ln w="0">
+              <a:noFill/>
+            </a:ln>
+          </p:spPr>
+          <p:style>
+            <a:lnRef idx="2">
+              <a:schemeClr val="accent1">
+                <a:shade val="50000"/>
+              </a:schemeClr>
+            </a:lnRef>
+            <a:fillRef idx="1">
+              <a:schemeClr val="accent1"/>
+            </a:fillRef>
+            <a:effectRef idx="0">
+              <a:schemeClr val="accent1"/>
+            </a:effectRef>
+            <a:fontRef idx="minor">
+              <a:schemeClr val="lt1"/>
+            </a:fontRef>
+          </p:style>
+          <p:txBody>
+            <a:bodyPr rtlCol="0" anchor="ctr"/>
+            <a:lstStyle/>
+            <a:p>
+              <a:pPr algn="ctr"/>
+              <a:endParaRPr lang="fr-FR"/>
+            </a:p>
+          </p:txBody>
+        </p:sp>
+        <p:sp>
+          <p:nvSpPr>
+            <p:cNvPr id="12" name="Ellipse 11">
+              <a:extLst>
+                <a:ext uri="{FF2B5EF4-FFF2-40B4-BE49-F238E27FC236}">
+                  <a16:creationId xmlns:a16="http://schemas.microsoft.com/office/drawing/2014/main" id="{0492F599-4EC9-4081-8DD4-AE2D39CBB9C2}"/>
+                </a:ext>
+              </a:extLst>
+            </p:cNvPr>
+            <p:cNvSpPr/>
+            <p:nvPr/>
+          </p:nvSpPr>
+          <p:spPr>
+            <a:xfrm>
+              <a:off x="2893496" y="3783136"/>
+              <a:ext cx="271272" cy="271272"/>
+            </a:xfrm>
+            <a:prstGeom prst="ellipse">
+              <a:avLst/>
+            </a:prstGeom>
+            <a:solidFill>
+              <a:schemeClr val="bg2"/>
+            </a:solidFill>
+            <a:ln w="0">
+              <a:noFill/>
+            </a:ln>
+          </p:spPr>
+          <p:style>
+            <a:lnRef idx="2">
+              <a:schemeClr val="accent1">
+                <a:shade val="50000"/>
+              </a:schemeClr>
+            </a:lnRef>
+            <a:fillRef idx="1">
+              <a:schemeClr val="accent1"/>
+            </a:fillRef>
+            <a:effectRef idx="0">
+              <a:schemeClr val="accent1"/>
+            </a:effectRef>
+            <a:fontRef idx="minor">
+              <a:schemeClr val="lt1"/>
+            </a:fontRef>
+          </p:style>
+          <p:txBody>
+            <a:bodyPr rtlCol="0" anchor="ctr"/>
+            <a:lstStyle/>
+            <a:p>
+              <a:pPr algn="ctr"/>
+              <a:endParaRPr lang="fr-FR"/>
+            </a:p>
+          </p:txBody>
+        </p:sp>
+        <p:sp>
+          <p:nvSpPr>
+            <p:cNvPr id="13" name="Ellipse 12">
+              <a:extLst>
+                <a:ext uri="{FF2B5EF4-FFF2-40B4-BE49-F238E27FC236}">
+                  <a16:creationId xmlns:a16="http://schemas.microsoft.com/office/drawing/2014/main" id="{6D363A10-9DCF-404D-B22D-DC6FA53CC39E}"/>
+                </a:ext>
+              </a:extLst>
+            </p:cNvPr>
+            <p:cNvSpPr/>
+            <p:nvPr/>
+          </p:nvSpPr>
+          <p:spPr>
+            <a:xfrm>
+              <a:off x="1094232" y="4244908"/>
+              <a:ext cx="271272" cy="271272"/>
+            </a:xfrm>
+            <a:prstGeom prst="ellipse">
+              <a:avLst/>
+            </a:prstGeom>
+            <a:solidFill>
+              <a:schemeClr val="bg2"/>
+            </a:solidFill>
+            <a:ln w="0">
+              <a:noFill/>
+            </a:ln>
+          </p:spPr>
+          <p:style>
+            <a:lnRef idx="2">
+              <a:schemeClr val="accent1">
+                <a:shade val="50000"/>
+              </a:schemeClr>
+            </a:lnRef>
+            <a:fillRef idx="1">
+              <a:schemeClr val="accent1"/>
+            </a:fillRef>
+            <a:effectRef idx="0">
+              <a:schemeClr val="accent1"/>
+            </a:effectRef>
+            <a:fontRef idx="minor">
+              <a:schemeClr val="lt1"/>
+            </a:fontRef>
+          </p:style>
+          <p:txBody>
+            <a:bodyPr rtlCol="0" anchor="ctr"/>
+            <a:lstStyle/>
+            <a:p>
+              <a:pPr algn="ctr"/>
+              <a:endParaRPr lang="fr-FR"/>
+            </a:p>
+          </p:txBody>
+        </p:sp>
+        <p:sp>
+          <p:nvSpPr>
+            <p:cNvPr id="14" name="Ellipse 13">
+              <a:extLst>
+                <a:ext uri="{FF2B5EF4-FFF2-40B4-BE49-F238E27FC236}">
+                  <a16:creationId xmlns:a16="http://schemas.microsoft.com/office/drawing/2014/main" id="{5D04C25A-18E5-49D9-9236-58C47A731693}"/>
+                </a:ext>
+              </a:extLst>
+            </p:cNvPr>
+            <p:cNvSpPr/>
+            <p:nvPr/>
+          </p:nvSpPr>
+          <p:spPr>
+            <a:xfrm>
+              <a:off x="1694740" y="4244908"/>
+              <a:ext cx="271272" cy="271272"/>
+            </a:xfrm>
+            <a:prstGeom prst="ellipse">
+              <a:avLst/>
+            </a:prstGeom>
+            <a:solidFill>
+              <a:schemeClr val="bg2"/>
+            </a:solidFill>
+            <a:ln w="0">
+              <a:noFill/>
+            </a:ln>
+          </p:spPr>
+          <p:style>
+            <a:lnRef idx="2">
+              <a:schemeClr val="accent1">
+                <a:shade val="50000"/>
+              </a:schemeClr>
+            </a:lnRef>
+            <a:fillRef idx="1">
+              <a:schemeClr val="accent1"/>
+            </a:fillRef>
+            <a:effectRef idx="0">
+              <a:schemeClr val="accent1"/>
+            </a:effectRef>
+            <a:fontRef idx="minor">
+              <a:schemeClr val="lt1"/>
+            </a:fontRef>
+          </p:style>
+          <p:txBody>
+            <a:bodyPr rtlCol="0" anchor="ctr"/>
+            <a:lstStyle/>
+            <a:p>
+              <a:pPr algn="ctr"/>
+              <a:endParaRPr lang="fr-FR"/>
+            </a:p>
+          </p:txBody>
+        </p:sp>
+        <p:sp>
+          <p:nvSpPr>
+            <p:cNvPr id="15" name="Ellipse 14">
+              <a:extLst>
+                <a:ext uri="{FF2B5EF4-FFF2-40B4-BE49-F238E27FC236}">
+                  <a16:creationId xmlns:a16="http://schemas.microsoft.com/office/drawing/2014/main" id="{4BBF6698-35BD-47E4-A683-87CEE348D65C}"/>
+                </a:ext>
+              </a:extLst>
+            </p:cNvPr>
+            <p:cNvSpPr/>
+            <p:nvPr/>
+          </p:nvSpPr>
+          <p:spPr>
+            <a:xfrm>
+              <a:off x="2292988" y="4244908"/>
+              <a:ext cx="271272" cy="271272"/>
+            </a:xfrm>
+            <a:prstGeom prst="ellipse">
+              <a:avLst/>
+            </a:prstGeom>
+            <a:solidFill>
+              <a:schemeClr val="bg2"/>
+            </a:solidFill>
+            <a:ln w="0">
+              <a:noFill/>
+            </a:ln>
+          </p:spPr>
+          <p:style>
+            <a:lnRef idx="2">
+              <a:schemeClr val="accent1">
+                <a:shade val="50000"/>
+              </a:schemeClr>
+            </a:lnRef>
+            <a:fillRef idx="1">
+              <a:schemeClr val="accent1"/>
+            </a:fillRef>
+            <a:effectRef idx="0">
+              <a:schemeClr val="accent1"/>
+            </a:effectRef>
+            <a:fontRef idx="minor">
+              <a:schemeClr val="lt1"/>
+            </a:fontRef>
+          </p:style>
+          <p:txBody>
+            <a:bodyPr rtlCol="0" anchor="ctr"/>
+            <a:lstStyle/>
+            <a:p>
+              <a:pPr algn="ctr"/>
+              <a:endParaRPr lang="fr-FR"/>
+            </a:p>
+          </p:txBody>
+        </p:sp>
+        <p:sp>
+          <p:nvSpPr>
+            <p:cNvPr id="16" name="Ellipse 15">
+              <a:extLst>
+                <a:ext uri="{FF2B5EF4-FFF2-40B4-BE49-F238E27FC236}">
+                  <a16:creationId xmlns:a16="http://schemas.microsoft.com/office/drawing/2014/main" id="{F853650D-D4D4-4B40-BFF7-61E959E58950}"/>
+                </a:ext>
+              </a:extLst>
+            </p:cNvPr>
+            <p:cNvSpPr/>
+            <p:nvPr/>
+          </p:nvSpPr>
+          <p:spPr>
+            <a:xfrm>
+              <a:off x="2893496" y="4244908"/>
+              <a:ext cx="271272" cy="271272"/>
+            </a:xfrm>
+            <a:prstGeom prst="ellipse">
+              <a:avLst/>
+            </a:prstGeom>
+            <a:solidFill>
+              <a:schemeClr val="bg2"/>
+            </a:solidFill>
+            <a:ln w="0">
+              <a:noFill/>
+            </a:ln>
+          </p:spPr>
+          <p:style>
+            <a:lnRef idx="2">
+              <a:schemeClr val="accent1">
+                <a:shade val="50000"/>
+              </a:schemeClr>
+            </a:lnRef>
+            <a:fillRef idx="1">
+              <a:schemeClr val="accent1"/>
+            </a:fillRef>
+            <a:effectRef idx="0">
+              <a:schemeClr val="accent1"/>
+            </a:effectRef>
+            <a:fontRef idx="minor">
+              <a:schemeClr val="lt1"/>
+            </a:fontRef>
+          </p:style>
+          <p:txBody>
+            <a:bodyPr rtlCol="0" anchor="ctr"/>
+            <a:lstStyle/>
+            <a:p>
+              <a:pPr algn="ctr"/>
+              <a:endParaRPr lang="fr-FR"/>
+            </a:p>
+          </p:txBody>
+        </p:sp>
+        <p:sp>
+          <p:nvSpPr>
+            <p:cNvPr id="17" name="Ellipse 16">
+              <a:extLst>
+                <a:ext uri="{FF2B5EF4-FFF2-40B4-BE49-F238E27FC236}">
+                  <a16:creationId xmlns:a16="http://schemas.microsoft.com/office/drawing/2014/main" id="{CC457F28-F07E-49BF-8ED3-C422F5976273}"/>
+                </a:ext>
+              </a:extLst>
+            </p:cNvPr>
+            <p:cNvSpPr/>
+            <p:nvPr/>
+          </p:nvSpPr>
+          <p:spPr>
+            <a:xfrm>
+              <a:off x="1094232" y="4706680"/>
+              <a:ext cx="271272" cy="271272"/>
+            </a:xfrm>
+            <a:prstGeom prst="ellipse">
+              <a:avLst/>
+            </a:prstGeom>
+            <a:solidFill>
+              <a:schemeClr val="bg2"/>
+            </a:solidFill>
+            <a:ln w="0">
+              <a:noFill/>
+            </a:ln>
+          </p:spPr>
+          <p:style>
+            <a:lnRef idx="2">
+              <a:schemeClr val="accent1">
+                <a:shade val="50000"/>
+              </a:schemeClr>
+            </a:lnRef>
+            <a:fillRef idx="1">
+              <a:schemeClr val="accent1"/>
+            </a:fillRef>
+            <a:effectRef idx="0">
+              <a:schemeClr val="accent1"/>
+            </a:effectRef>
+            <a:fontRef idx="minor">
+              <a:schemeClr val="lt1"/>
+            </a:fontRef>
+          </p:style>
+          <p:txBody>
+            <a:bodyPr rtlCol="0" anchor="ctr"/>
+            <a:lstStyle/>
+            <a:p>
+              <a:pPr algn="ctr"/>
+              <a:endParaRPr lang="fr-FR"/>
+            </a:p>
+          </p:txBody>
+        </p:sp>
+        <p:sp>
+          <p:nvSpPr>
+            <p:cNvPr id="18" name="Ellipse 17">
+              <a:extLst>
+                <a:ext uri="{FF2B5EF4-FFF2-40B4-BE49-F238E27FC236}">
+                  <a16:creationId xmlns:a16="http://schemas.microsoft.com/office/drawing/2014/main" id="{403C83DB-8CA4-4807-9BE9-F2C711E347AC}"/>
+                </a:ext>
+              </a:extLst>
+            </p:cNvPr>
+            <p:cNvSpPr/>
+            <p:nvPr/>
+          </p:nvSpPr>
+          <p:spPr>
+            <a:xfrm>
+              <a:off x="1694740" y="4706680"/>
+              <a:ext cx="271272" cy="271272"/>
+            </a:xfrm>
+            <a:prstGeom prst="ellipse">
+              <a:avLst/>
+            </a:prstGeom>
+            <a:solidFill>
+              <a:schemeClr val="bg2"/>
+            </a:solidFill>
+            <a:ln w="0">
+              <a:noFill/>
+            </a:ln>
+          </p:spPr>
+          <p:style>
+            <a:lnRef idx="2">
+              <a:schemeClr val="accent1">
+                <a:shade val="50000"/>
+              </a:schemeClr>
+            </a:lnRef>
+            <a:fillRef idx="1">
+              <a:schemeClr val="accent1"/>
+            </a:fillRef>
+            <a:effectRef idx="0">
+              <a:schemeClr val="accent1"/>
+            </a:effectRef>
+            <a:fontRef idx="minor">
+              <a:schemeClr val="lt1"/>
+            </a:fontRef>
+          </p:style>
+          <p:txBody>
+            <a:bodyPr rtlCol="0" anchor="ctr"/>
+            <a:lstStyle/>
+            <a:p>
+              <a:pPr algn="ctr"/>
+              <a:endParaRPr lang="fr-FR" dirty="0"/>
+            </a:p>
+          </p:txBody>
+        </p:sp>
+        <p:sp>
+          <p:nvSpPr>
+            <p:cNvPr id="19" name="Rectangle : coins arrondis 18">
+              <a:extLst>
+                <a:ext uri="{FF2B5EF4-FFF2-40B4-BE49-F238E27FC236}">
+                  <a16:creationId xmlns:a16="http://schemas.microsoft.com/office/drawing/2014/main" id="{E5C3B364-4E0B-40A6-9DC7-F9D466E3702F}"/>
+                </a:ext>
+              </a:extLst>
+            </p:cNvPr>
+            <p:cNvSpPr/>
+            <p:nvPr/>
+          </p:nvSpPr>
+          <p:spPr>
+            <a:xfrm>
+              <a:off x="2292988" y="4706680"/>
+              <a:ext cx="271272" cy="271272"/>
+            </a:xfrm>
+            <a:prstGeom prst="roundRect">
+              <a:avLst/>
+            </a:prstGeom>
+            <a:solidFill>
+              <a:schemeClr val="accent4">
+                <a:lumMod val="40000"/>
+                <a:lumOff val="60000"/>
+              </a:schemeClr>
+            </a:solidFill>
+            <a:ln w="0">
+              <a:noFill/>
+            </a:ln>
+          </p:spPr>
+          <p:style>
+            <a:lnRef idx="2">
+              <a:schemeClr val="accent1">
+                <a:shade val="50000"/>
+              </a:schemeClr>
+            </a:lnRef>
+            <a:fillRef idx="1">
+              <a:schemeClr val="accent1"/>
+            </a:fillRef>
+            <a:effectRef idx="0">
+              <a:schemeClr val="accent1"/>
+            </a:effectRef>
+            <a:fontRef idx="minor">
+              <a:schemeClr val="lt1"/>
+            </a:fontRef>
+          </p:style>
+          <p:txBody>
+            <a:bodyPr rtlCol="0" anchor="ctr"/>
+            <a:lstStyle/>
+            <a:p>
+              <a:pPr algn="ctr"/>
+              <a:endParaRPr lang="fr-FR" dirty="0"/>
+            </a:p>
+          </p:txBody>
+        </p:sp>
+        <p:sp>
+          <p:nvSpPr>
+            <p:cNvPr id="20" name="Ellipse 19">
+              <a:extLst>
+                <a:ext uri="{FF2B5EF4-FFF2-40B4-BE49-F238E27FC236}">
+                  <a16:creationId xmlns:a16="http://schemas.microsoft.com/office/drawing/2014/main" id="{1F16BC01-372C-4E9A-94D1-F0484D6C7953}"/>
+                </a:ext>
+              </a:extLst>
+            </p:cNvPr>
+            <p:cNvSpPr/>
+            <p:nvPr/>
+          </p:nvSpPr>
+          <p:spPr>
+            <a:xfrm>
+              <a:off x="2893496" y="4706680"/>
+              <a:ext cx="271272" cy="271272"/>
+            </a:xfrm>
+            <a:prstGeom prst="ellipse">
+              <a:avLst/>
+            </a:prstGeom>
+            <a:solidFill>
+              <a:schemeClr val="bg2"/>
+            </a:solidFill>
+            <a:ln w="0">
+              <a:noFill/>
+            </a:ln>
+          </p:spPr>
+          <p:style>
+            <a:lnRef idx="2">
+              <a:schemeClr val="accent1">
+                <a:shade val="50000"/>
+              </a:schemeClr>
+            </a:lnRef>
+            <a:fillRef idx="1">
+              <a:schemeClr val="accent1"/>
+            </a:fillRef>
+            <a:effectRef idx="0">
+              <a:schemeClr val="accent1"/>
+            </a:effectRef>
+            <a:fontRef idx="minor">
+              <a:schemeClr val="lt1"/>
+            </a:fontRef>
+          </p:style>
+          <p:txBody>
+            <a:bodyPr rtlCol="0" anchor="ctr"/>
+            <a:lstStyle/>
+            <a:p>
+              <a:pPr algn="ctr"/>
+              <a:endParaRPr lang="fr-FR"/>
+            </a:p>
+          </p:txBody>
+        </p:sp>
+        <p:sp>
+          <p:nvSpPr>
+            <p:cNvPr id="21" name="Ellipse 20">
+              <a:extLst>
+                <a:ext uri="{FF2B5EF4-FFF2-40B4-BE49-F238E27FC236}">
+                  <a16:creationId xmlns:a16="http://schemas.microsoft.com/office/drawing/2014/main" id="{ABAFD4EC-1572-4025-BCC5-B9A1F7032F31}"/>
+                </a:ext>
+              </a:extLst>
+            </p:cNvPr>
+            <p:cNvSpPr/>
+            <p:nvPr/>
+          </p:nvSpPr>
+          <p:spPr>
+            <a:xfrm>
+              <a:off x="1094232" y="5159114"/>
+              <a:ext cx="271272" cy="271272"/>
+            </a:xfrm>
+            <a:prstGeom prst="ellipse">
+              <a:avLst/>
+            </a:prstGeom>
+            <a:solidFill>
+              <a:schemeClr val="bg2"/>
+            </a:solidFill>
+            <a:ln w="0">
+              <a:noFill/>
+            </a:ln>
+          </p:spPr>
+          <p:style>
+            <a:lnRef idx="2">
+              <a:schemeClr val="accent1">
+                <a:shade val="50000"/>
+              </a:schemeClr>
+            </a:lnRef>
+            <a:fillRef idx="1">
+              <a:schemeClr val="accent1"/>
+            </a:fillRef>
+            <a:effectRef idx="0">
+              <a:schemeClr val="accent1"/>
+            </a:effectRef>
+            <a:fontRef idx="minor">
+              <a:schemeClr val="lt1"/>
+            </a:fontRef>
+          </p:style>
+          <p:txBody>
+            <a:bodyPr rtlCol="0" anchor="ctr"/>
+            <a:lstStyle/>
+            <a:p>
+              <a:pPr algn="ctr"/>
+              <a:endParaRPr lang="fr-FR"/>
+            </a:p>
+          </p:txBody>
+        </p:sp>
+        <p:sp>
+          <p:nvSpPr>
+            <p:cNvPr id="22" name="Ellipse 21">
+              <a:extLst>
+                <a:ext uri="{FF2B5EF4-FFF2-40B4-BE49-F238E27FC236}">
+                  <a16:creationId xmlns:a16="http://schemas.microsoft.com/office/drawing/2014/main" id="{784A8B35-1B1F-412C-9B98-28CFCC9E08D6}"/>
+                </a:ext>
+              </a:extLst>
+            </p:cNvPr>
+            <p:cNvSpPr/>
+            <p:nvPr/>
+          </p:nvSpPr>
+          <p:spPr>
+            <a:xfrm>
+              <a:off x="1694740" y="5159114"/>
+              <a:ext cx="271272" cy="271272"/>
+            </a:xfrm>
+            <a:prstGeom prst="ellipse">
+              <a:avLst/>
+            </a:prstGeom>
+            <a:solidFill>
+              <a:schemeClr val="bg2"/>
+            </a:solidFill>
+            <a:ln w="0">
+              <a:noFill/>
+            </a:ln>
+          </p:spPr>
+          <p:style>
+            <a:lnRef idx="2">
+              <a:schemeClr val="accent1">
+                <a:shade val="50000"/>
+              </a:schemeClr>
+            </a:lnRef>
+            <a:fillRef idx="1">
+              <a:schemeClr val="accent1"/>
+            </a:fillRef>
+            <a:effectRef idx="0">
+              <a:schemeClr val="accent1"/>
+            </a:effectRef>
+            <a:fontRef idx="minor">
+              <a:schemeClr val="lt1"/>
+            </a:fontRef>
+          </p:style>
+          <p:txBody>
+            <a:bodyPr rtlCol="0" anchor="ctr"/>
+            <a:lstStyle/>
+            <a:p>
+              <a:pPr algn="ctr"/>
+              <a:endParaRPr lang="fr-FR"/>
+            </a:p>
+          </p:txBody>
+        </p:sp>
+        <p:sp>
+          <p:nvSpPr>
+            <p:cNvPr id="23" name="Ellipse 22">
+              <a:extLst>
+                <a:ext uri="{FF2B5EF4-FFF2-40B4-BE49-F238E27FC236}">
+                  <a16:creationId xmlns:a16="http://schemas.microsoft.com/office/drawing/2014/main" id="{5BD6A0BD-DBB7-4EC1-B6DB-FD90B1F7F9C6}"/>
+                </a:ext>
+              </a:extLst>
+            </p:cNvPr>
+            <p:cNvSpPr/>
+            <p:nvPr/>
+          </p:nvSpPr>
+          <p:spPr>
+            <a:xfrm>
+              <a:off x="2292988" y="5159114"/>
+              <a:ext cx="271272" cy="271272"/>
+            </a:xfrm>
+            <a:prstGeom prst="ellipse">
+              <a:avLst/>
+            </a:prstGeom>
+            <a:solidFill>
+              <a:schemeClr val="bg2"/>
+            </a:solidFill>
+            <a:ln w="0">
+              <a:noFill/>
+            </a:ln>
+          </p:spPr>
+          <p:style>
+            <a:lnRef idx="2">
+              <a:schemeClr val="accent1">
+                <a:shade val="50000"/>
+              </a:schemeClr>
+            </a:lnRef>
+            <a:fillRef idx="1">
+              <a:schemeClr val="accent1"/>
+            </a:fillRef>
+            <a:effectRef idx="0">
+              <a:schemeClr val="accent1"/>
+            </a:effectRef>
+            <a:fontRef idx="minor">
+              <a:schemeClr val="lt1"/>
+            </a:fontRef>
+          </p:style>
+          <p:txBody>
+            <a:bodyPr rtlCol="0" anchor="ctr"/>
+            <a:lstStyle/>
+            <a:p>
+              <a:pPr algn="ctr"/>
+              <a:endParaRPr lang="fr-FR"/>
+            </a:p>
+          </p:txBody>
+        </p:sp>
+        <p:sp>
+          <p:nvSpPr>
+            <p:cNvPr id="24" name="Ellipse 23">
+              <a:extLst>
+                <a:ext uri="{FF2B5EF4-FFF2-40B4-BE49-F238E27FC236}">
+                  <a16:creationId xmlns:a16="http://schemas.microsoft.com/office/drawing/2014/main" id="{C8DE4108-9D5C-42FB-A737-BE41637A0062}"/>
+                </a:ext>
+              </a:extLst>
+            </p:cNvPr>
+            <p:cNvSpPr/>
+            <p:nvPr/>
+          </p:nvSpPr>
+          <p:spPr>
+            <a:xfrm>
+              <a:off x="2893496" y="5159114"/>
+              <a:ext cx="271272" cy="271272"/>
+            </a:xfrm>
+            <a:prstGeom prst="ellipse">
+              <a:avLst/>
+            </a:prstGeom>
+            <a:solidFill>
+              <a:schemeClr val="bg2"/>
+            </a:solidFill>
+            <a:ln w="0">
+              <a:noFill/>
+            </a:ln>
+          </p:spPr>
+          <p:style>
+            <a:lnRef idx="2">
+              <a:schemeClr val="accent1">
+                <a:shade val="50000"/>
+              </a:schemeClr>
+            </a:lnRef>
+            <a:fillRef idx="1">
+              <a:schemeClr val="accent1"/>
+            </a:fillRef>
+            <a:effectRef idx="0">
+              <a:schemeClr val="accent1"/>
+            </a:effectRef>
+            <a:fontRef idx="minor">
+              <a:schemeClr val="lt1"/>
+            </a:fontRef>
+          </p:style>
+          <p:txBody>
+            <a:bodyPr rtlCol="0" anchor="ctr"/>
+            <a:lstStyle/>
+            <a:p>
+              <a:pPr algn="ctr"/>
+              <a:endParaRPr lang="fr-FR"/>
+            </a:p>
+          </p:txBody>
+        </p:sp>
+      </p:grpSp>
+      <p:sp>
+        <p:nvSpPr>
+          <p:cNvPr id="25" name="Arc 24">
+            <a:extLst>
+              <a:ext uri="{FF2B5EF4-FFF2-40B4-BE49-F238E27FC236}">
+                <a16:creationId xmlns:a16="http://schemas.microsoft.com/office/drawing/2014/main" id="{6C143519-E1EE-4882-89D1-3473465E7B43}"/>
+              </a:ext>
+            </a:extLst>
+          </p:cNvPr>
+          <p:cNvSpPr/>
+          <p:nvPr/>
+        </p:nvSpPr>
+        <p:spPr>
+          <a:xfrm rot="6294721">
+            <a:off x="-382480" y="1480928"/>
+            <a:ext cx="2395806" cy="2395806"/>
+          </a:xfrm>
+          <a:prstGeom prst="arc">
+            <a:avLst>
+              <a:gd name="adj1" fmla="val 16200000"/>
+              <a:gd name="adj2" fmla="val 8036916"/>
+            </a:avLst>
+          </a:prstGeom>
+          <a:noFill/>
+          <a:ln w="127000" cap="rnd">
+            <a:solidFill>
+              <a:schemeClr val="accent4"/>
+            </a:solidFill>
+            <a:prstDash val="dash"/>
+          </a:ln>
+        </p:spPr>
+        <p:style>
+          <a:lnRef idx="2">
+            <a:schemeClr val="accent1">
+              <a:shade val="50000"/>
+            </a:schemeClr>
+          </a:lnRef>
+          <a:fillRef idx="1">
+            <a:schemeClr val="accent1"/>
+          </a:fillRef>
+          <a:effectRef idx="0">
+            <a:schemeClr val="accent1"/>
+          </a:effectRef>
+          <a:fontRef idx="minor">
+            <a:schemeClr val="lt1"/>
+          </a:fontRef>
+        </p:style>
+        <p:txBody>
+          <a:bodyPr rtlCol="0" anchor="ctr"/>
+          <a:lstStyle/>
+          <a:p>
+            <a:pPr algn="ctr"/>
+            <a:endParaRPr lang="fr-FR" dirty="0"/>
           </a:p>
         </p:txBody>
       </p:sp>
@@ -7310,6 +8703,9 @@
   <p:clrMapOvr>
     <a:masterClrMapping/>
   </p:clrMapOvr>
+  <p:transition>
+    <p:push dir="u"/>
+  </p:transition>
 </p:sld>
 </file>
 
@@ -7499,7 +8895,7 @@
                 <a:latin typeface="SF Pro Text" panose="00000500000000000000" pitchFamily="2" charset="0"/>
                 <a:ea typeface="SF Pro Text" panose="00000500000000000000" pitchFamily="2" charset="0"/>
               </a:rPr>
-              <a:t>L’objectif de ce projet consiste à associer les caractéristique d’écriture d’une page du manuscrit d’Avila à un copiste et de pouvoir, par la suite, prédire la classification d’une nouvelle donnée.</a:t>
+              <a:t>L’objectif de ce projet consiste à associer les caractéristique d’écriture d’une page du manuscrit d’Avila à un copiste et de pouvoir, par la suite, prédire la classification d’une nouvelle entrée donnée.</a:t>
             </a:r>
           </a:p>
         </p:txBody>
@@ -8512,8 +9908,8 @@
         </p:nvSpPr>
         <p:spPr>
           <a:xfrm>
-            <a:off x="860742" y="1173220"/>
-            <a:ext cx="4343556" cy="760469"/>
+            <a:off x="860742" y="961083"/>
+            <a:ext cx="4311026" cy="1315630"/>
           </a:xfrm>
           <a:prstGeom prst="rect">
             <a:avLst/>
@@ -8554,7 +9950,7 @@
                 <a:latin typeface="SF Pro Display" panose="00000500000000000000" pitchFamily="2" charset="0"/>
                 <a:ea typeface="SF Pro Display" panose="00000500000000000000" pitchFamily="2" charset="0"/>
               </a:rPr>
-              <a:t>Analyse</a:t>
+              <a:t>Analyse des attributs</a:t>
             </a:r>
             <a:endParaRPr lang="en-GB" dirty="0">
               <a:solidFill>
@@ -8569,73 +9965,6 @@
           </a:p>
         </p:txBody>
       </p:sp>
-      <p:sp>
-        <p:nvSpPr>
-          <p:cNvPr id="7" name="Titre 1">
-            <a:extLst>
-              <a:ext uri="{FF2B5EF4-FFF2-40B4-BE49-F238E27FC236}">
-                <a16:creationId xmlns:a16="http://schemas.microsoft.com/office/drawing/2014/main" id="{78B9ACEC-4212-4EFB-AECA-CAA25D42FABB}"/>
-              </a:ext>
-            </a:extLst>
-          </p:cNvPr>
-          <p:cNvSpPr txBox="1">
-            <a:spLocks/>
-          </p:cNvSpPr>
-          <p:nvPr/>
-        </p:nvSpPr>
-        <p:spPr>
-          <a:xfrm>
-            <a:off x="860742" y="2527660"/>
-            <a:ext cx="4343556" cy="760469"/>
-          </a:xfrm>
-          <a:prstGeom prst="rect">
-            <a:avLst/>
-          </a:prstGeom>
-        </p:spPr>
-        <p:txBody>
-          <a:bodyPr vert="horz" lIns="91440" tIns="45720" rIns="91440" bIns="45720" rtlCol="0" anchor="t">
-            <a:normAutofit/>
-          </a:bodyPr>
-          <a:lstStyle>
-            <a:lvl1pPr algn="l" defTabSz="914400" rtl="0" eaLnBrk="1" latinLnBrk="0" hangingPunct="1">
-              <a:lnSpc>
-                <a:spcPct val="90000"/>
-              </a:lnSpc>
-              <a:spcBef>
-                <a:spcPct val="0"/>
-              </a:spcBef>
-              <a:buNone/>
-              <a:defRPr sz="4400" kern="1200">
-                <a:solidFill>
-                  <a:schemeClr val="tx1"/>
-                </a:solidFill>
-                <a:latin typeface="+mj-lt"/>
-                <a:ea typeface="+mj-ea"/>
-                <a:cs typeface="+mj-cs"/>
-              </a:defRPr>
-            </a:lvl1pPr>
-          </a:lstStyle>
-          <a:p>
-            <a:r>
-              <a:rPr lang="fr-FR" sz="2800" dirty="0">
-                <a:solidFill>
-                  <a:schemeClr val="accent5"/>
-                </a:solidFill>
-                <a:latin typeface="SF Pro Display" panose="00000500000000000000" pitchFamily="2" charset="0"/>
-                <a:ea typeface="SF Pro Display" panose="00000500000000000000" pitchFamily="2" charset="0"/>
-              </a:rPr>
-              <a:t>Sélection des attributs</a:t>
-            </a:r>
-            <a:endParaRPr lang="en-GB" sz="2800" dirty="0">
-              <a:solidFill>
-                <a:schemeClr val="accent5"/>
-              </a:solidFill>
-              <a:latin typeface="SF Pro Display" panose="00000500000000000000" pitchFamily="2" charset="0"/>
-              <a:ea typeface="SF Pro Display" panose="00000500000000000000" pitchFamily="2" charset="0"/>
-            </a:endParaRPr>
-          </a:p>
-        </p:txBody>
-      </p:sp>
       <p:cxnSp>
         <p:nvCxnSpPr>
           <p:cNvPr id="8" name="Connecteur droit 7">
@@ -8652,7 +9981,7 @@
         </p:nvCxnSpPr>
         <p:spPr>
           <a:xfrm>
-            <a:off x="-601982" y="1933689"/>
+            <a:off x="-159531" y="2346644"/>
             <a:ext cx="2189071" cy="0"/>
           </a:xfrm>
           <a:prstGeom prst="line">
@@ -8682,6 +10011,341 @@
           </a:fontRef>
         </p:style>
       </p:cxnSp>
+      <p:sp>
+        <p:nvSpPr>
+          <p:cNvPr id="9" name="Sous-titre 2">
+            <a:extLst>
+              <a:ext uri="{FF2B5EF4-FFF2-40B4-BE49-F238E27FC236}">
+                <a16:creationId xmlns:a16="http://schemas.microsoft.com/office/drawing/2014/main" id="{6C8C1439-A023-4477-9EC4-F3CA3D8D89A8}"/>
+              </a:ext>
+            </a:extLst>
+          </p:cNvPr>
+          <p:cNvSpPr txBox="1">
+            <a:spLocks/>
+          </p:cNvSpPr>
+          <p:nvPr/>
+        </p:nvSpPr>
+        <p:spPr>
+          <a:xfrm>
+            <a:off x="860742" y="2710598"/>
+            <a:ext cx="10493058" cy="2764503"/>
+          </a:xfrm>
+          <a:prstGeom prst="rect">
+            <a:avLst/>
+          </a:prstGeom>
+        </p:spPr>
+        <p:txBody>
+          <a:bodyPr vert="horz" lIns="91440" tIns="45720" rIns="91440" bIns="45720" rtlCol="0">
+            <a:normAutofit/>
+          </a:bodyPr>
+          <a:lstStyle>
+            <a:lvl1pPr marL="228600" indent="-228600" algn="l" defTabSz="914400" rtl="0" eaLnBrk="1" latinLnBrk="0" hangingPunct="1">
+              <a:lnSpc>
+                <a:spcPct val="90000"/>
+              </a:lnSpc>
+              <a:spcBef>
+                <a:spcPts val="1000"/>
+              </a:spcBef>
+              <a:buFont typeface="Arial" panose="020B0604020202020204" pitchFamily="34" charset="0"/>
+              <a:buChar char="•"/>
+              <a:defRPr sz="2800" kern="1200">
+                <a:solidFill>
+                  <a:schemeClr val="tx1"/>
+                </a:solidFill>
+                <a:latin typeface="+mn-lt"/>
+                <a:ea typeface="+mn-ea"/>
+                <a:cs typeface="+mn-cs"/>
+              </a:defRPr>
+            </a:lvl1pPr>
+            <a:lvl2pPr marL="685800" indent="-228600" algn="l" defTabSz="914400" rtl="0" eaLnBrk="1" latinLnBrk="0" hangingPunct="1">
+              <a:lnSpc>
+                <a:spcPct val="90000"/>
+              </a:lnSpc>
+              <a:spcBef>
+                <a:spcPts val="500"/>
+              </a:spcBef>
+              <a:buFont typeface="Arial" panose="020B0604020202020204" pitchFamily="34" charset="0"/>
+              <a:buChar char="•"/>
+              <a:defRPr sz="2400" kern="1200">
+                <a:solidFill>
+                  <a:schemeClr val="tx1"/>
+                </a:solidFill>
+                <a:latin typeface="+mn-lt"/>
+                <a:ea typeface="+mn-ea"/>
+                <a:cs typeface="+mn-cs"/>
+              </a:defRPr>
+            </a:lvl2pPr>
+            <a:lvl3pPr marL="1143000" indent="-228600" algn="l" defTabSz="914400" rtl="0" eaLnBrk="1" latinLnBrk="0" hangingPunct="1">
+              <a:lnSpc>
+                <a:spcPct val="90000"/>
+              </a:lnSpc>
+              <a:spcBef>
+                <a:spcPts val="500"/>
+              </a:spcBef>
+              <a:buFont typeface="Arial" panose="020B0604020202020204" pitchFamily="34" charset="0"/>
+              <a:buChar char="•"/>
+              <a:defRPr sz="2000" kern="1200">
+                <a:solidFill>
+                  <a:schemeClr val="tx1"/>
+                </a:solidFill>
+                <a:latin typeface="+mn-lt"/>
+                <a:ea typeface="+mn-ea"/>
+                <a:cs typeface="+mn-cs"/>
+              </a:defRPr>
+            </a:lvl3pPr>
+            <a:lvl4pPr marL="1600200" indent="-228600" algn="l" defTabSz="914400" rtl="0" eaLnBrk="1" latinLnBrk="0" hangingPunct="1">
+              <a:lnSpc>
+                <a:spcPct val="90000"/>
+              </a:lnSpc>
+              <a:spcBef>
+                <a:spcPts val="500"/>
+              </a:spcBef>
+              <a:buFont typeface="Arial" panose="020B0604020202020204" pitchFamily="34" charset="0"/>
+              <a:buChar char="•"/>
+              <a:defRPr sz="1800" kern="1200">
+                <a:solidFill>
+                  <a:schemeClr val="tx1"/>
+                </a:solidFill>
+                <a:latin typeface="+mn-lt"/>
+                <a:ea typeface="+mn-ea"/>
+                <a:cs typeface="+mn-cs"/>
+              </a:defRPr>
+            </a:lvl4pPr>
+            <a:lvl5pPr marL="2057400" indent="-228600" algn="l" defTabSz="914400" rtl="0" eaLnBrk="1" latinLnBrk="0" hangingPunct="1">
+              <a:lnSpc>
+                <a:spcPct val="90000"/>
+              </a:lnSpc>
+              <a:spcBef>
+                <a:spcPts val="500"/>
+              </a:spcBef>
+              <a:buFont typeface="Arial" panose="020B0604020202020204" pitchFamily="34" charset="0"/>
+              <a:buChar char="•"/>
+              <a:defRPr sz="1800" kern="1200">
+                <a:solidFill>
+                  <a:schemeClr val="tx1"/>
+                </a:solidFill>
+                <a:latin typeface="+mn-lt"/>
+                <a:ea typeface="+mn-ea"/>
+                <a:cs typeface="+mn-cs"/>
+              </a:defRPr>
+            </a:lvl5pPr>
+            <a:lvl6pPr marL="2514600" indent="-228600" algn="l" defTabSz="914400" rtl="0" eaLnBrk="1" latinLnBrk="0" hangingPunct="1">
+              <a:lnSpc>
+                <a:spcPct val="90000"/>
+              </a:lnSpc>
+              <a:spcBef>
+                <a:spcPts val="500"/>
+              </a:spcBef>
+              <a:buFont typeface="Arial" panose="020B0604020202020204" pitchFamily="34" charset="0"/>
+              <a:buChar char="•"/>
+              <a:defRPr sz="1800" kern="1200">
+                <a:solidFill>
+                  <a:schemeClr val="tx1"/>
+                </a:solidFill>
+                <a:latin typeface="+mn-lt"/>
+                <a:ea typeface="+mn-ea"/>
+                <a:cs typeface="+mn-cs"/>
+              </a:defRPr>
+            </a:lvl6pPr>
+            <a:lvl7pPr marL="2971800" indent="-228600" algn="l" defTabSz="914400" rtl="0" eaLnBrk="1" latinLnBrk="0" hangingPunct="1">
+              <a:lnSpc>
+                <a:spcPct val="90000"/>
+              </a:lnSpc>
+              <a:spcBef>
+                <a:spcPts val="500"/>
+              </a:spcBef>
+              <a:buFont typeface="Arial" panose="020B0604020202020204" pitchFamily="34" charset="0"/>
+              <a:buChar char="•"/>
+              <a:defRPr sz="1800" kern="1200">
+                <a:solidFill>
+                  <a:schemeClr val="tx1"/>
+                </a:solidFill>
+                <a:latin typeface="+mn-lt"/>
+                <a:ea typeface="+mn-ea"/>
+                <a:cs typeface="+mn-cs"/>
+              </a:defRPr>
+            </a:lvl7pPr>
+            <a:lvl8pPr marL="3429000" indent="-228600" algn="l" defTabSz="914400" rtl="0" eaLnBrk="1" latinLnBrk="0" hangingPunct="1">
+              <a:lnSpc>
+                <a:spcPct val="90000"/>
+              </a:lnSpc>
+              <a:spcBef>
+                <a:spcPts val="500"/>
+              </a:spcBef>
+              <a:buFont typeface="Arial" panose="020B0604020202020204" pitchFamily="34" charset="0"/>
+              <a:buChar char="•"/>
+              <a:defRPr sz="1800" kern="1200">
+                <a:solidFill>
+                  <a:schemeClr val="tx1"/>
+                </a:solidFill>
+                <a:latin typeface="+mn-lt"/>
+                <a:ea typeface="+mn-ea"/>
+                <a:cs typeface="+mn-cs"/>
+              </a:defRPr>
+            </a:lvl8pPr>
+            <a:lvl9pPr marL="3886200" indent="-228600" algn="l" defTabSz="914400" rtl="0" eaLnBrk="1" latinLnBrk="0" hangingPunct="1">
+              <a:lnSpc>
+                <a:spcPct val="90000"/>
+              </a:lnSpc>
+              <a:spcBef>
+                <a:spcPts val="500"/>
+              </a:spcBef>
+              <a:buFont typeface="Arial" panose="020B0604020202020204" pitchFamily="34" charset="0"/>
+              <a:buChar char="•"/>
+              <a:defRPr sz="1800" kern="1200">
+                <a:solidFill>
+                  <a:schemeClr val="tx1"/>
+                </a:solidFill>
+                <a:latin typeface="+mn-lt"/>
+                <a:ea typeface="+mn-ea"/>
+                <a:cs typeface="+mn-cs"/>
+              </a:defRPr>
+            </a:lvl9pPr>
+          </a:lstStyle>
+          <a:p>
+            <a:pPr marL="0" indent="0">
+              <a:lnSpc>
+                <a:spcPct val="100000"/>
+              </a:lnSpc>
+              <a:buNone/>
+            </a:pPr>
+            <a:r>
+              <a:rPr lang="fr-FR" sz="2400" dirty="0">
+                <a:solidFill>
+                  <a:schemeClr val="tx1">
+                    <a:lumMod val="65000"/>
+                    <a:lumOff val="35000"/>
+                  </a:schemeClr>
+                </a:solidFill>
+                <a:latin typeface="SF Pro Text" panose="00000500000000000000" pitchFamily="2" charset="0"/>
+                <a:ea typeface="SF Pro Text" panose="00000500000000000000" pitchFamily="2" charset="0"/>
+              </a:rPr>
+              <a:t>Dans un premier temps nous avons étudié les attributs afin d’étudier leur lien avec la classe cible.</a:t>
+            </a:r>
+          </a:p>
+          <a:p>
+            <a:pPr marL="0" indent="0">
+              <a:lnSpc>
+                <a:spcPct val="100000"/>
+              </a:lnSpc>
+              <a:buNone/>
+            </a:pPr>
+            <a:r>
+              <a:rPr lang="fr-FR" sz="2400" dirty="0">
+                <a:solidFill>
+                  <a:schemeClr val="tx1">
+                    <a:lumMod val="65000"/>
+                    <a:lumOff val="35000"/>
+                  </a:schemeClr>
+                </a:solidFill>
+                <a:latin typeface="SF Pro Text" panose="00000500000000000000" pitchFamily="2" charset="0"/>
+                <a:ea typeface="SF Pro Text" panose="00000500000000000000" pitchFamily="2" charset="0"/>
+              </a:rPr>
+              <a:t>Pour se faire nous avons comparé les </a:t>
+            </a:r>
+            <a:r>
+              <a:rPr lang="fr-FR" sz="2400" dirty="0">
+                <a:solidFill>
+                  <a:schemeClr val="accent6"/>
+                </a:solidFill>
+                <a:latin typeface="SF Pro Text" panose="00000500000000000000" pitchFamily="2" charset="0"/>
+                <a:ea typeface="SF Pro Text" panose="00000500000000000000" pitchFamily="2" charset="0"/>
+              </a:rPr>
+              <a:t>variances</a:t>
+            </a:r>
+            <a:r>
+              <a:rPr lang="fr-FR" sz="2400" dirty="0">
+                <a:solidFill>
+                  <a:schemeClr val="tx1">
+                    <a:lumMod val="65000"/>
+                    <a:lumOff val="35000"/>
+                  </a:schemeClr>
+                </a:solidFill>
+                <a:latin typeface="SF Pro Text" panose="00000500000000000000" pitchFamily="2" charset="0"/>
+                <a:ea typeface="SF Pro Text" panose="00000500000000000000" pitchFamily="2" charset="0"/>
+              </a:rPr>
+              <a:t> des attributs par type de classe et visionner la </a:t>
+            </a:r>
+            <a:r>
+              <a:rPr lang="fr-FR" sz="2400" dirty="0">
+                <a:solidFill>
+                  <a:schemeClr val="accent6"/>
+                </a:solidFill>
+                <a:latin typeface="SF Pro Text" panose="00000500000000000000" pitchFamily="2" charset="0"/>
+                <a:ea typeface="SF Pro Text" panose="00000500000000000000" pitchFamily="2" charset="0"/>
+              </a:rPr>
+              <a:t>corrélations</a:t>
+            </a:r>
+            <a:r>
+              <a:rPr lang="fr-FR" sz="2400" dirty="0">
+                <a:solidFill>
+                  <a:schemeClr val="tx1">
+                    <a:lumMod val="65000"/>
+                    <a:lumOff val="35000"/>
+                  </a:schemeClr>
+                </a:solidFill>
+                <a:latin typeface="SF Pro Text" panose="00000500000000000000" pitchFamily="2" charset="0"/>
+                <a:ea typeface="SF Pro Text" panose="00000500000000000000" pitchFamily="2" charset="0"/>
+              </a:rPr>
+              <a:t> de chaque attributs entre eux.</a:t>
+            </a:r>
+          </a:p>
+          <a:p>
+            <a:pPr marL="0" indent="0">
+              <a:lnSpc>
+                <a:spcPct val="100000"/>
+              </a:lnSpc>
+              <a:buNone/>
+            </a:pPr>
+            <a:r>
+              <a:rPr lang="fr-FR" sz="2400" dirty="0">
+                <a:solidFill>
+                  <a:schemeClr val="tx1">
+                    <a:lumMod val="65000"/>
+                    <a:lumOff val="35000"/>
+                  </a:schemeClr>
+                </a:solidFill>
+                <a:latin typeface="SF Pro Text" panose="00000500000000000000" pitchFamily="2" charset="0"/>
+                <a:ea typeface="SF Pro Text" panose="00000500000000000000" pitchFamily="2" charset="0"/>
+              </a:rPr>
+              <a:t>Nous avons ensuite sélectionné les attributs les plus pertinent selon des critères de </a:t>
+            </a:r>
+            <a:r>
+              <a:rPr lang="fr-FR" sz="2400" dirty="0">
+                <a:solidFill>
+                  <a:schemeClr val="accent5"/>
+                </a:solidFill>
+                <a:latin typeface="SF Pro Text" panose="00000500000000000000" pitchFamily="2" charset="0"/>
+                <a:ea typeface="SF Pro Text" panose="00000500000000000000" pitchFamily="2" charset="0"/>
+              </a:rPr>
+              <a:t>corrélation faible</a:t>
+            </a:r>
+            <a:r>
+              <a:rPr lang="fr-FR" sz="2400" dirty="0">
+                <a:solidFill>
+                  <a:schemeClr val="tx1">
+                    <a:lumMod val="65000"/>
+                    <a:lumOff val="35000"/>
+                  </a:schemeClr>
+                </a:solidFill>
+                <a:latin typeface="SF Pro Text" panose="00000500000000000000" pitchFamily="2" charset="0"/>
+                <a:ea typeface="SF Pro Text" panose="00000500000000000000" pitchFamily="2" charset="0"/>
+              </a:rPr>
+              <a:t> et de </a:t>
+            </a:r>
+            <a:r>
+              <a:rPr lang="fr-FR" sz="2400" dirty="0">
+                <a:solidFill>
+                  <a:schemeClr val="accent5"/>
+                </a:solidFill>
+                <a:latin typeface="SF Pro Text" panose="00000500000000000000" pitchFamily="2" charset="0"/>
+                <a:ea typeface="SF Pro Text" panose="00000500000000000000" pitchFamily="2" charset="0"/>
+              </a:rPr>
+              <a:t>variances haute</a:t>
+            </a:r>
+          </a:p>
+        </p:txBody>
+      </p:sp>
     </p:spTree>
     <p:extLst>
       <p:ext uri="{BB962C8B-B14F-4D97-AF65-F5344CB8AC3E}">
@@ -8788,8 +10452,8 @@
         </p:nvSpPr>
         <p:spPr>
           <a:xfrm>
-            <a:off x="860742" y="1173220"/>
-            <a:ext cx="4343556" cy="760469"/>
+            <a:off x="860742" y="1153395"/>
+            <a:ext cx="4343556" cy="1206186"/>
           </a:xfrm>
           <a:prstGeom prst="rect">
             <a:avLst/>
@@ -8797,7 +10461,7 @@
         </p:spPr>
         <p:txBody>
           <a:bodyPr vert="horz" lIns="91440" tIns="45720" rIns="91440" bIns="45720" rtlCol="0" anchor="t">
-            <a:normAutofit/>
+            <a:normAutofit lnSpcReduction="10000"/>
           </a:bodyPr>
           <a:lstStyle>
             <a:lvl1pPr algn="l" defTabSz="914400" rtl="0" eaLnBrk="1" latinLnBrk="0" hangingPunct="1">
@@ -8830,7 +10494,7 @@
                 <a:latin typeface="SF Pro Display" panose="00000500000000000000" pitchFamily="2" charset="0"/>
                 <a:ea typeface="SF Pro Display" panose="00000500000000000000" pitchFamily="2" charset="0"/>
               </a:rPr>
-              <a:t>Analyse</a:t>
+              <a:t>Résolution du problème</a:t>
             </a:r>
             <a:endParaRPr lang="en-GB" dirty="0">
               <a:solidFill>
@@ -8845,73 +10509,6 @@
           </a:p>
         </p:txBody>
       </p:sp>
-      <p:sp>
-        <p:nvSpPr>
-          <p:cNvPr id="7" name="Titre 1">
-            <a:extLst>
-              <a:ext uri="{FF2B5EF4-FFF2-40B4-BE49-F238E27FC236}">
-                <a16:creationId xmlns:a16="http://schemas.microsoft.com/office/drawing/2014/main" id="{78B9ACEC-4212-4EFB-AECA-CAA25D42FABB}"/>
-              </a:ext>
-            </a:extLst>
-          </p:cNvPr>
-          <p:cNvSpPr txBox="1">
-            <a:spLocks/>
-          </p:cNvSpPr>
-          <p:nvPr/>
-        </p:nvSpPr>
-        <p:spPr>
-          <a:xfrm>
-            <a:off x="860742" y="2527660"/>
-            <a:ext cx="4343556" cy="760469"/>
-          </a:xfrm>
-          <a:prstGeom prst="rect">
-            <a:avLst/>
-          </a:prstGeom>
-        </p:spPr>
-        <p:txBody>
-          <a:bodyPr vert="horz" lIns="91440" tIns="45720" rIns="91440" bIns="45720" rtlCol="0" anchor="t">
-            <a:normAutofit/>
-          </a:bodyPr>
-          <a:lstStyle>
-            <a:lvl1pPr algn="l" defTabSz="914400" rtl="0" eaLnBrk="1" latinLnBrk="0" hangingPunct="1">
-              <a:lnSpc>
-                <a:spcPct val="90000"/>
-              </a:lnSpc>
-              <a:spcBef>
-                <a:spcPct val="0"/>
-              </a:spcBef>
-              <a:buNone/>
-              <a:defRPr sz="4400" kern="1200">
-                <a:solidFill>
-                  <a:schemeClr val="tx1"/>
-                </a:solidFill>
-                <a:latin typeface="+mj-lt"/>
-                <a:ea typeface="+mj-ea"/>
-                <a:cs typeface="+mj-cs"/>
-              </a:defRPr>
-            </a:lvl1pPr>
-          </a:lstStyle>
-          <a:p>
-            <a:r>
-              <a:rPr lang="fr-FR" sz="2800" dirty="0">
-                <a:solidFill>
-                  <a:schemeClr val="accent5"/>
-                </a:solidFill>
-                <a:latin typeface="SF Pro Display" panose="00000500000000000000" pitchFamily="2" charset="0"/>
-                <a:ea typeface="SF Pro Display" panose="00000500000000000000" pitchFamily="2" charset="0"/>
-              </a:rPr>
-              <a:t>Sélection des attributs</a:t>
-            </a:r>
-            <a:endParaRPr lang="en-GB" sz="2800" dirty="0">
-              <a:solidFill>
-                <a:schemeClr val="accent5"/>
-              </a:solidFill>
-              <a:latin typeface="SF Pro Display" panose="00000500000000000000" pitchFamily="2" charset="0"/>
-              <a:ea typeface="SF Pro Display" panose="00000500000000000000" pitchFamily="2" charset="0"/>
-            </a:endParaRPr>
-          </a:p>
-        </p:txBody>
-      </p:sp>
       <p:cxnSp>
         <p:nvCxnSpPr>
           <p:cNvPr id="8" name="Connecteur droit 7">
@@ -8928,7 +10525,7 @@
         </p:nvCxnSpPr>
         <p:spPr>
           <a:xfrm>
-            <a:off x="-601982" y="1933689"/>
+            <a:off x="-336511" y="2494128"/>
             <a:ext cx="2189071" cy="0"/>
           </a:xfrm>
           <a:prstGeom prst="line">
@@ -8955,6 +10552,389 @@
           </a:fontRef>
         </p:style>
       </p:cxnSp>
+      <p:sp>
+        <p:nvSpPr>
+          <p:cNvPr id="9" name="Sous-titre 2">
+            <a:extLst>
+              <a:ext uri="{FF2B5EF4-FFF2-40B4-BE49-F238E27FC236}">
+                <a16:creationId xmlns:a16="http://schemas.microsoft.com/office/drawing/2014/main" id="{32A4DBA7-A69B-48A6-879D-71DC969B789C}"/>
+              </a:ext>
+            </a:extLst>
+          </p:cNvPr>
+          <p:cNvSpPr txBox="1">
+            <a:spLocks/>
+          </p:cNvSpPr>
+          <p:nvPr/>
+        </p:nvSpPr>
+        <p:spPr>
+          <a:xfrm>
+            <a:off x="860742" y="3074392"/>
+            <a:ext cx="10493058" cy="2764503"/>
+          </a:xfrm>
+          <a:prstGeom prst="rect">
+            <a:avLst/>
+          </a:prstGeom>
+        </p:spPr>
+        <p:txBody>
+          <a:bodyPr vert="horz" lIns="91440" tIns="45720" rIns="91440" bIns="45720" rtlCol="0">
+            <a:normAutofit/>
+          </a:bodyPr>
+          <a:lstStyle>
+            <a:lvl1pPr marL="228600" indent="-228600" algn="l" defTabSz="914400" rtl="0" eaLnBrk="1" latinLnBrk="0" hangingPunct="1">
+              <a:lnSpc>
+                <a:spcPct val="90000"/>
+              </a:lnSpc>
+              <a:spcBef>
+                <a:spcPts val="1000"/>
+              </a:spcBef>
+              <a:buFont typeface="Arial" panose="020B0604020202020204" pitchFamily="34" charset="0"/>
+              <a:buChar char="•"/>
+              <a:defRPr sz="2800" kern="1200">
+                <a:solidFill>
+                  <a:schemeClr val="tx1"/>
+                </a:solidFill>
+                <a:latin typeface="+mn-lt"/>
+                <a:ea typeface="+mn-ea"/>
+                <a:cs typeface="+mn-cs"/>
+              </a:defRPr>
+            </a:lvl1pPr>
+            <a:lvl2pPr marL="685800" indent="-228600" algn="l" defTabSz="914400" rtl="0" eaLnBrk="1" latinLnBrk="0" hangingPunct="1">
+              <a:lnSpc>
+                <a:spcPct val="90000"/>
+              </a:lnSpc>
+              <a:spcBef>
+                <a:spcPts val="500"/>
+              </a:spcBef>
+              <a:buFont typeface="Arial" panose="020B0604020202020204" pitchFamily="34" charset="0"/>
+              <a:buChar char="•"/>
+              <a:defRPr sz="2400" kern="1200">
+                <a:solidFill>
+                  <a:schemeClr val="tx1"/>
+                </a:solidFill>
+                <a:latin typeface="+mn-lt"/>
+                <a:ea typeface="+mn-ea"/>
+                <a:cs typeface="+mn-cs"/>
+              </a:defRPr>
+            </a:lvl2pPr>
+            <a:lvl3pPr marL="1143000" indent="-228600" algn="l" defTabSz="914400" rtl="0" eaLnBrk="1" latinLnBrk="0" hangingPunct="1">
+              <a:lnSpc>
+                <a:spcPct val="90000"/>
+              </a:lnSpc>
+              <a:spcBef>
+                <a:spcPts val="500"/>
+              </a:spcBef>
+              <a:buFont typeface="Arial" panose="020B0604020202020204" pitchFamily="34" charset="0"/>
+              <a:buChar char="•"/>
+              <a:defRPr sz="2000" kern="1200">
+                <a:solidFill>
+                  <a:schemeClr val="tx1"/>
+                </a:solidFill>
+                <a:latin typeface="+mn-lt"/>
+                <a:ea typeface="+mn-ea"/>
+                <a:cs typeface="+mn-cs"/>
+              </a:defRPr>
+            </a:lvl3pPr>
+            <a:lvl4pPr marL="1600200" indent="-228600" algn="l" defTabSz="914400" rtl="0" eaLnBrk="1" latinLnBrk="0" hangingPunct="1">
+              <a:lnSpc>
+                <a:spcPct val="90000"/>
+              </a:lnSpc>
+              <a:spcBef>
+                <a:spcPts val="500"/>
+              </a:spcBef>
+              <a:buFont typeface="Arial" panose="020B0604020202020204" pitchFamily="34" charset="0"/>
+              <a:buChar char="•"/>
+              <a:defRPr sz="1800" kern="1200">
+                <a:solidFill>
+                  <a:schemeClr val="tx1"/>
+                </a:solidFill>
+                <a:latin typeface="+mn-lt"/>
+                <a:ea typeface="+mn-ea"/>
+                <a:cs typeface="+mn-cs"/>
+              </a:defRPr>
+            </a:lvl4pPr>
+            <a:lvl5pPr marL="2057400" indent="-228600" algn="l" defTabSz="914400" rtl="0" eaLnBrk="1" latinLnBrk="0" hangingPunct="1">
+              <a:lnSpc>
+                <a:spcPct val="90000"/>
+              </a:lnSpc>
+              <a:spcBef>
+                <a:spcPts val="500"/>
+              </a:spcBef>
+              <a:buFont typeface="Arial" panose="020B0604020202020204" pitchFamily="34" charset="0"/>
+              <a:buChar char="•"/>
+              <a:defRPr sz="1800" kern="1200">
+                <a:solidFill>
+                  <a:schemeClr val="tx1"/>
+                </a:solidFill>
+                <a:latin typeface="+mn-lt"/>
+                <a:ea typeface="+mn-ea"/>
+                <a:cs typeface="+mn-cs"/>
+              </a:defRPr>
+            </a:lvl5pPr>
+            <a:lvl6pPr marL="2514600" indent="-228600" algn="l" defTabSz="914400" rtl="0" eaLnBrk="1" latinLnBrk="0" hangingPunct="1">
+              <a:lnSpc>
+                <a:spcPct val="90000"/>
+              </a:lnSpc>
+              <a:spcBef>
+                <a:spcPts val="500"/>
+              </a:spcBef>
+              <a:buFont typeface="Arial" panose="020B0604020202020204" pitchFamily="34" charset="0"/>
+              <a:buChar char="•"/>
+              <a:defRPr sz="1800" kern="1200">
+                <a:solidFill>
+                  <a:schemeClr val="tx1"/>
+                </a:solidFill>
+                <a:latin typeface="+mn-lt"/>
+                <a:ea typeface="+mn-ea"/>
+                <a:cs typeface="+mn-cs"/>
+              </a:defRPr>
+            </a:lvl6pPr>
+            <a:lvl7pPr marL="2971800" indent="-228600" algn="l" defTabSz="914400" rtl="0" eaLnBrk="1" latinLnBrk="0" hangingPunct="1">
+              <a:lnSpc>
+                <a:spcPct val="90000"/>
+              </a:lnSpc>
+              <a:spcBef>
+                <a:spcPts val="500"/>
+              </a:spcBef>
+              <a:buFont typeface="Arial" panose="020B0604020202020204" pitchFamily="34" charset="0"/>
+              <a:buChar char="•"/>
+              <a:defRPr sz="1800" kern="1200">
+                <a:solidFill>
+                  <a:schemeClr val="tx1"/>
+                </a:solidFill>
+                <a:latin typeface="+mn-lt"/>
+                <a:ea typeface="+mn-ea"/>
+                <a:cs typeface="+mn-cs"/>
+              </a:defRPr>
+            </a:lvl7pPr>
+            <a:lvl8pPr marL="3429000" indent="-228600" algn="l" defTabSz="914400" rtl="0" eaLnBrk="1" latinLnBrk="0" hangingPunct="1">
+              <a:lnSpc>
+                <a:spcPct val="90000"/>
+              </a:lnSpc>
+              <a:spcBef>
+                <a:spcPts val="500"/>
+              </a:spcBef>
+              <a:buFont typeface="Arial" panose="020B0604020202020204" pitchFamily="34" charset="0"/>
+              <a:buChar char="•"/>
+              <a:defRPr sz="1800" kern="1200">
+                <a:solidFill>
+                  <a:schemeClr val="tx1"/>
+                </a:solidFill>
+                <a:latin typeface="+mn-lt"/>
+                <a:ea typeface="+mn-ea"/>
+                <a:cs typeface="+mn-cs"/>
+              </a:defRPr>
+            </a:lvl8pPr>
+            <a:lvl9pPr marL="3886200" indent="-228600" algn="l" defTabSz="914400" rtl="0" eaLnBrk="1" latinLnBrk="0" hangingPunct="1">
+              <a:lnSpc>
+                <a:spcPct val="90000"/>
+              </a:lnSpc>
+              <a:spcBef>
+                <a:spcPts val="500"/>
+              </a:spcBef>
+              <a:buFont typeface="Arial" panose="020B0604020202020204" pitchFamily="34" charset="0"/>
+              <a:buChar char="•"/>
+              <a:defRPr sz="1800" kern="1200">
+                <a:solidFill>
+                  <a:schemeClr val="tx1"/>
+                </a:solidFill>
+                <a:latin typeface="+mn-lt"/>
+                <a:ea typeface="+mn-ea"/>
+                <a:cs typeface="+mn-cs"/>
+              </a:defRPr>
+            </a:lvl9pPr>
+          </a:lstStyle>
+          <a:p>
+            <a:pPr marL="0" indent="0">
+              <a:lnSpc>
+                <a:spcPct val="100000"/>
+              </a:lnSpc>
+              <a:buNone/>
+            </a:pPr>
+            <a:r>
+              <a:rPr lang="fr-FR" sz="2400" dirty="0">
+                <a:solidFill>
+                  <a:schemeClr val="tx1">
+                    <a:lumMod val="65000"/>
+                    <a:lumOff val="35000"/>
+                  </a:schemeClr>
+                </a:solidFill>
+                <a:latin typeface="SF Pro Text" panose="00000500000000000000" pitchFamily="2" charset="0"/>
+                <a:ea typeface="SF Pro Text" panose="00000500000000000000" pitchFamily="2" charset="0"/>
+              </a:rPr>
+              <a:t>Afin de répondre au problème du sujet nous avons opter pour une classification.</a:t>
+            </a:r>
+          </a:p>
+          <a:p>
+            <a:pPr marL="0" indent="0">
+              <a:lnSpc>
+                <a:spcPct val="100000"/>
+              </a:lnSpc>
+              <a:buNone/>
+            </a:pPr>
+            <a:r>
+              <a:rPr lang="fr-FR" sz="2400" dirty="0">
+                <a:solidFill>
+                  <a:schemeClr val="tx1">
+                    <a:lumMod val="65000"/>
+                    <a:lumOff val="35000"/>
+                  </a:schemeClr>
+                </a:solidFill>
+                <a:latin typeface="SF Pro Text" panose="00000500000000000000" pitchFamily="2" charset="0"/>
+                <a:ea typeface="SF Pro Text" panose="00000500000000000000" pitchFamily="2" charset="0"/>
+              </a:rPr>
+              <a:t>Nous avons étudié 6 modèles de classification afin de trouver le modèle correspondant au mieux à l’ensemble des données. Voici les modèles utilisés : </a:t>
+            </a:r>
+            <a:r>
+              <a:rPr lang="fr-FR" sz="2400" dirty="0">
+                <a:solidFill>
+                  <a:schemeClr val="accent5"/>
+                </a:solidFill>
+                <a:latin typeface="SF Pro Text" panose="00000500000000000000" pitchFamily="2" charset="0"/>
+                <a:ea typeface="SF Pro Text" panose="00000500000000000000" pitchFamily="2" charset="0"/>
+              </a:rPr>
+              <a:t>k-NN</a:t>
+            </a:r>
+            <a:r>
+              <a:rPr lang="fr-FR" sz="2400" dirty="0">
+                <a:solidFill>
+                  <a:schemeClr val="tx1">
+                    <a:lumMod val="65000"/>
+                    <a:lumOff val="35000"/>
+                  </a:schemeClr>
+                </a:solidFill>
+                <a:latin typeface="SF Pro Text" panose="00000500000000000000" pitchFamily="2" charset="0"/>
+                <a:ea typeface="SF Pro Text" panose="00000500000000000000" pitchFamily="2" charset="0"/>
+              </a:rPr>
+              <a:t>, </a:t>
+            </a:r>
+            <a:r>
+              <a:rPr lang="en-GB" sz="2400" dirty="0">
+                <a:solidFill>
+                  <a:schemeClr val="accent5"/>
+                </a:solidFill>
+                <a:latin typeface="SF Pro Text" panose="00000500000000000000" pitchFamily="2" charset="0"/>
+                <a:ea typeface="SF Pro Text" panose="00000500000000000000" pitchFamily="2" charset="0"/>
+              </a:rPr>
+              <a:t>Logistic regression</a:t>
+            </a:r>
+            <a:r>
+              <a:rPr lang="fr-FR" sz="2400" dirty="0">
+                <a:solidFill>
+                  <a:schemeClr val="tx1">
+                    <a:lumMod val="65000"/>
+                    <a:lumOff val="35000"/>
+                  </a:schemeClr>
+                </a:solidFill>
+                <a:latin typeface="SF Pro Text" panose="00000500000000000000" pitchFamily="2" charset="0"/>
+                <a:ea typeface="SF Pro Text" panose="00000500000000000000" pitchFamily="2" charset="0"/>
+              </a:rPr>
+              <a:t>, </a:t>
+            </a:r>
+            <a:r>
+              <a:rPr lang="en-GB" sz="2400" dirty="0">
+                <a:solidFill>
+                  <a:schemeClr val="accent5"/>
+                </a:solidFill>
+                <a:latin typeface="SF Pro Text" panose="00000500000000000000" pitchFamily="2" charset="0"/>
+                <a:ea typeface="SF Pro Text" panose="00000500000000000000" pitchFamily="2" charset="0"/>
+              </a:rPr>
+              <a:t>Support Vector Machine</a:t>
+            </a:r>
+            <a:r>
+              <a:rPr lang="fr-FR" sz="2400" dirty="0">
+                <a:solidFill>
+                  <a:schemeClr val="accent5"/>
+                </a:solidFill>
+                <a:latin typeface="SF Pro Text" panose="00000500000000000000" pitchFamily="2" charset="0"/>
+                <a:ea typeface="SF Pro Text" panose="00000500000000000000" pitchFamily="2" charset="0"/>
+              </a:rPr>
+              <a:t> (SVM)</a:t>
+            </a:r>
+            <a:r>
+              <a:rPr lang="fr-FR" sz="2400" dirty="0">
+                <a:solidFill>
+                  <a:schemeClr val="tx1">
+                    <a:lumMod val="65000"/>
+                    <a:lumOff val="35000"/>
+                  </a:schemeClr>
+                </a:solidFill>
+                <a:latin typeface="SF Pro Text" panose="00000500000000000000" pitchFamily="2" charset="0"/>
+                <a:ea typeface="SF Pro Text" panose="00000500000000000000" pitchFamily="2" charset="0"/>
+              </a:rPr>
+              <a:t>, </a:t>
+            </a:r>
+            <a:r>
+              <a:rPr lang="en-GB" sz="2400" dirty="0">
+                <a:solidFill>
+                  <a:schemeClr val="accent5"/>
+                </a:solidFill>
+                <a:latin typeface="SF Pro Text" panose="00000500000000000000" pitchFamily="2" charset="0"/>
+                <a:ea typeface="SF Pro Text" panose="00000500000000000000" pitchFamily="2" charset="0"/>
+              </a:rPr>
+              <a:t>Random Forest</a:t>
+            </a:r>
+            <a:r>
+              <a:rPr lang="fr-FR" sz="2400" dirty="0">
+                <a:solidFill>
+                  <a:schemeClr val="tx1">
+                    <a:lumMod val="65000"/>
+                    <a:lumOff val="35000"/>
+                  </a:schemeClr>
+                </a:solidFill>
+                <a:latin typeface="SF Pro Text" panose="00000500000000000000" pitchFamily="2" charset="0"/>
+                <a:ea typeface="SF Pro Text" panose="00000500000000000000" pitchFamily="2" charset="0"/>
+              </a:rPr>
+              <a:t>, </a:t>
+            </a:r>
+            <a:r>
+              <a:rPr lang="en-GB" sz="2400" dirty="0">
+                <a:solidFill>
+                  <a:schemeClr val="accent5"/>
+                </a:solidFill>
+                <a:latin typeface="SF Pro Text" panose="00000500000000000000" pitchFamily="2" charset="0"/>
+                <a:ea typeface="SF Pro Text" panose="00000500000000000000" pitchFamily="2" charset="0"/>
+              </a:rPr>
+              <a:t>Decision Tree</a:t>
+            </a:r>
+            <a:r>
+              <a:rPr lang="fr-FR" sz="2400" dirty="0">
+                <a:solidFill>
+                  <a:schemeClr val="tx1">
+                    <a:lumMod val="65000"/>
+                    <a:lumOff val="35000"/>
+                  </a:schemeClr>
+                </a:solidFill>
+                <a:latin typeface="SF Pro Text" panose="00000500000000000000" pitchFamily="2" charset="0"/>
+                <a:ea typeface="SF Pro Text" panose="00000500000000000000" pitchFamily="2" charset="0"/>
+              </a:rPr>
+              <a:t> et </a:t>
+            </a:r>
+            <a:r>
+              <a:rPr lang="en-GB" sz="2400" dirty="0">
+                <a:solidFill>
+                  <a:schemeClr val="accent5"/>
+                </a:solidFill>
+                <a:latin typeface="SF Pro Text" panose="00000500000000000000" pitchFamily="2" charset="0"/>
+                <a:ea typeface="SF Pro Text" panose="00000500000000000000" pitchFamily="2" charset="0"/>
+              </a:rPr>
+              <a:t>Naive Bayes</a:t>
+            </a:r>
+            <a:r>
+              <a:rPr lang="fr-FR" sz="2400" dirty="0">
+                <a:solidFill>
+                  <a:schemeClr val="tx1">
+                    <a:lumMod val="65000"/>
+                    <a:lumOff val="35000"/>
+                  </a:schemeClr>
+                </a:solidFill>
+                <a:latin typeface="SF Pro Text" panose="00000500000000000000" pitchFamily="2" charset="0"/>
+                <a:ea typeface="SF Pro Text" panose="00000500000000000000" pitchFamily="2" charset="0"/>
+              </a:rPr>
+              <a:t>.</a:t>
+            </a:r>
+          </a:p>
+        </p:txBody>
+      </p:sp>
     </p:spTree>
     <p:extLst>
       <p:ext uri="{BB962C8B-B14F-4D97-AF65-F5344CB8AC3E}">
@@ -8993,7 +10973,7 @@
           <p:cNvPr id="4" name="Espace réservé du pied de page 3">
             <a:extLst>
               <a:ext uri="{FF2B5EF4-FFF2-40B4-BE49-F238E27FC236}">
-                <a16:creationId xmlns:a16="http://schemas.microsoft.com/office/drawing/2014/main" id="{E4769A77-1D83-4E26-BBEE-159BF35AB7EA}"/>
+                <a16:creationId xmlns:a16="http://schemas.microsoft.com/office/drawing/2014/main" id="{6AB5EA0A-9988-4801-9066-9FB682502B0A}"/>
               </a:ext>
             </a:extLst>
           </p:cNvPr>
@@ -9021,7 +11001,7 @@
           <p:cNvPr id="5" name="Espace réservé du numéro de diapositive 4">
             <a:extLst>
               <a:ext uri="{FF2B5EF4-FFF2-40B4-BE49-F238E27FC236}">
-                <a16:creationId xmlns:a16="http://schemas.microsoft.com/office/drawing/2014/main" id="{AFA90A82-1BF9-48DE-930C-71D077FB90CF}"/>
+                <a16:creationId xmlns:a16="http://schemas.microsoft.com/office/drawing/2014/main" id="{6701E979-86F2-4451-8A6C-0E00620379DD}"/>
               </a:ext>
             </a:extLst>
           </p:cNvPr>
@@ -9047,10 +11027,10 @@
       </p:sp>
       <p:sp>
         <p:nvSpPr>
-          <p:cNvPr id="6" name="Titre 1">
+          <p:cNvPr id="6" name="Sous-titre 2">
             <a:extLst>
               <a:ext uri="{FF2B5EF4-FFF2-40B4-BE49-F238E27FC236}">
-                <a16:creationId xmlns:a16="http://schemas.microsoft.com/office/drawing/2014/main" id="{49A9826D-60F0-4B0C-91B7-8413A907A019}"/>
+                <a16:creationId xmlns:a16="http://schemas.microsoft.com/office/drawing/2014/main" id="{7CDB5BB8-6864-4B4A-A598-B9C83AFC31EE}"/>
               </a:ext>
             </a:extLst>
           </p:cNvPr>
@@ -9061,59 +11041,311 @@
         </p:nvSpPr>
         <p:spPr>
           <a:xfrm>
-            <a:off x="860742" y="1124988"/>
-            <a:ext cx="4234042" cy="2387600"/>
+            <a:off x="838200" y="781460"/>
+            <a:ext cx="10377529" cy="5019572"/>
           </a:xfrm>
           <a:prstGeom prst="rect">
             <a:avLst/>
           </a:prstGeom>
         </p:spPr>
         <p:txBody>
-          <a:bodyPr vert="horz" lIns="91440" tIns="45720" rIns="91440" bIns="45720" rtlCol="0" anchor="t">
-            <a:normAutofit fontScale="97500"/>
+          <a:bodyPr vert="horz" lIns="91440" tIns="45720" rIns="91440" bIns="45720" rtlCol="0">
+            <a:normAutofit/>
           </a:bodyPr>
           <a:lstStyle>
-            <a:lvl1pPr algn="l" defTabSz="914400" rtl="0" eaLnBrk="1" latinLnBrk="0" hangingPunct="1">
+            <a:lvl1pPr marL="228600" indent="-228600" algn="l" defTabSz="914400" rtl="0" eaLnBrk="1" latinLnBrk="0" hangingPunct="1">
               <a:lnSpc>
                 <a:spcPct val="90000"/>
               </a:lnSpc>
               <a:spcBef>
-                <a:spcPct val="0"/>
+                <a:spcPts val="1000"/>
               </a:spcBef>
-              <a:buNone/>
-              <a:defRPr sz="4400" kern="1200">
+              <a:buFont typeface="Arial" panose="020B0604020202020204" pitchFamily="34" charset="0"/>
+              <a:buChar char="•"/>
+              <a:defRPr sz="2800" kern="1200">
                 <a:solidFill>
                   <a:schemeClr val="tx1"/>
                 </a:solidFill>
-                <a:latin typeface="+mj-lt"/>
-                <a:ea typeface="+mj-ea"/>
-                <a:cs typeface="+mj-cs"/>
+                <a:latin typeface="+mn-lt"/>
+                <a:ea typeface="+mn-ea"/>
+                <a:cs typeface="+mn-cs"/>
               </a:defRPr>
             </a:lvl1pPr>
+            <a:lvl2pPr marL="685800" indent="-228600" algn="l" defTabSz="914400" rtl="0" eaLnBrk="1" latinLnBrk="0" hangingPunct="1">
+              <a:lnSpc>
+                <a:spcPct val="90000"/>
+              </a:lnSpc>
+              <a:spcBef>
+                <a:spcPts val="500"/>
+              </a:spcBef>
+              <a:buFont typeface="Arial" panose="020B0604020202020204" pitchFamily="34" charset="0"/>
+              <a:buChar char="•"/>
+              <a:defRPr sz="2400" kern="1200">
+                <a:solidFill>
+                  <a:schemeClr val="tx1"/>
+                </a:solidFill>
+                <a:latin typeface="+mn-lt"/>
+                <a:ea typeface="+mn-ea"/>
+                <a:cs typeface="+mn-cs"/>
+              </a:defRPr>
+            </a:lvl2pPr>
+            <a:lvl3pPr marL="1143000" indent="-228600" algn="l" defTabSz="914400" rtl="0" eaLnBrk="1" latinLnBrk="0" hangingPunct="1">
+              <a:lnSpc>
+                <a:spcPct val="90000"/>
+              </a:lnSpc>
+              <a:spcBef>
+                <a:spcPts val="500"/>
+              </a:spcBef>
+              <a:buFont typeface="Arial" panose="020B0604020202020204" pitchFamily="34" charset="0"/>
+              <a:buChar char="•"/>
+              <a:defRPr sz="2000" kern="1200">
+                <a:solidFill>
+                  <a:schemeClr val="tx1"/>
+                </a:solidFill>
+                <a:latin typeface="+mn-lt"/>
+                <a:ea typeface="+mn-ea"/>
+                <a:cs typeface="+mn-cs"/>
+              </a:defRPr>
+            </a:lvl3pPr>
+            <a:lvl4pPr marL="1600200" indent="-228600" algn="l" defTabSz="914400" rtl="0" eaLnBrk="1" latinLnBrk="0" hangingPunct="1">
+              <a:lnSpc>
+                <a:spcPct val="90000"/>
+              </a:lnSpc>
+              <a:spcBef>
+                <a:spcPts val="500"/>
+              </a:spcBef>
+              <a:buFont typeface="Arial" panose="020B0604020202020204" pitchFamily="34" charset="0"/>
+              <a:buChar char="•"/>
+              <a:defRPr sz="1800" kern="1200">
+                <a:solidFill>
+                  <a:schemeClr val="tx1"/>
+                </a:solidFill>
+                <a:latin typeface="+mn-lt"/>
+                <a:ea typeface="+mn-ea"/>
+                <a:cs typeface="+mn-cs"/>
+              </a:defRPr>
+            </a:lvl4pPr>
+            <a:lvl5pPr marL="2057400" indent="-228600" algn="l" defTabSz="914400" rtl="0" eaLnBrk="1" latinLnBrk="0" hangingPunct="1">
+              <a:lnSpc>
+                <a:spcPct val="90000"/>
+              </a:lnSpc>
+              <a:spcBef>
+                <a:spcPts val="500"/>
+              </a:spcBef>
+              <a:buFont typeface="Arial" panose="020B0604020202020204" pitchFamily="34" charset="0"/>
+              <a:buChar char="•"/>
+              <a:defRPr sz="1800" kern="1200">
+                <a:solidFill>
+                  <a:schemeClr val="tx1"/>
+                </a:solidFill>
+                <a:latin typeface="+mn-lt"/>
+                <a:ea typeface="+mn-ea"/>
+                <a:cs typeface="+mn-cs"/>
+              </a:defRPr>
+            </a:lvl5pPr>
+            <a:lvl6pPr marL="2514600" indent="-228600" algn="l" defTabSz="914400" rtl="0" eaLnBrk="1" latinLnBrk="0" hangingPunct="1">
+              <a:lnSpc>
+                <a:spcPct val="90000"/>
+              </a:lnSpc>
+              <a:spcBef>
+                <a:spcPts val="500"/>
+              </a:spcBef>
+              <a:buFont typeface="Arial" panose="020B0604020202020204" pitchFamily="34" charset="0"/>
+              <a:buChar char="•"/>
+              <a:defRPr sz="1800" kern="1200">
+                <a:solidFill>
+                  <a:schemeClr val="tx1"/>
+                </a:solidFill>
+                <a:latin typeface="+mn-lt"/>
+                <a:ea typeface="+mn-ea"/>
+                <a:cs typeface="+mn-cs"/>
+              </a:defRPr>
+            </a:lvl6pPr>
+            <a:lvl7pPr marL="2971800" indent="-228600" algn="l" defTabSz="914400" rtl="0" eaLnBrk="1" latinLnBrk="0" hangingPunct="1">
+              <a:lnSpc>
+                <a:spcPct val="90000"/>
+              </a:lnSpc>
+              <a:spcBef>
+                <a:spcPts val="500"/>
+              </a:spcBef>
+              <a:buFont typeface="Arial" panose="020B0604020202020204" pitchFamily="34" charset="0"/>
+              <a:buChar char="•"/>
+              <a:defRPr sz="1800" kern="1200">
+                <a:solidFill>
+                  <a:schemeClr val="tx1"/>
+                </a:solidFill>
+                <a:latin typeface="+mn-lt"/>
+                <a:ea typeface="+mn-ea"/>
+                <a:cs typeface="+mn-cs"/>
+              </a:defRPr>
+            </a:lvl7pPr>
+            <a:lvl8pPr marL="3429000" indent="-228600" algn="l" defTabSz="914400" rtl="0" eaLnBrk="1" latinLnBrk="0" hangingPunct="1">
+              <a:lnSpc>
+                <a:spcPct val="90000"/>
+              </a:lnSpc>
+              <a:spcBef>
+                <a:spcPts val="500"/>
+              </a:spcBef>
+              <a:buFont typeface="Arial" panose="020B0604020202020204" pitchFamily="34" charset="0"/>
+              <a:buChar char="•"/>
+              <a:defRPr sz="1800" kern="1200">
+                <a:solidFill>
+                  <a:schemeClr val="tx1"/>
+                </a:solidFill>
+                <a:latin typeface="+mn-lt"/>
+                <a:ea typeface="+mn-ea"/>
+                <a:cs typeface="+mn-cs"/>
+              </a:defRPr>
+            </a:lvl8pPr>
+            <a:lvl9pPr marL="3886200" indent="-228600" algn="l" defTabSz="914400" rtl="0" eaLnBrk="1" latinLnBrk="0" hangingPunct="1">
+              <a:lnSpc>
+                <a:spcPct val="90000"/>
+              </a:lnSpc>
+              <a:spcBef>
+                <a:spcPts val="500"/>
+              </a:spcBef>
+              <a:buFont typeface="Arial" panose="020B0604020202020204" pitchFamily="34" charset="0"/>
+              <a:buChar char="•"/>
+              <a:defRPr sz="1800" kern="1200">
+                <a:solidFill>
+                  <a:schemeClr val="tx1"/>
+                </a:solidFill>
+                <a:latin typeface="+mn-lt"/>
+                <a:ea typeface="+mn-ea"/>
+                <a:cs typeface="+mn-cs"/>
+              </a:defRPr>
+            </a:lvl9pPr>
           </a:lstStyle>
           <a:p>
-            <a:r>
-              <a:rPr lang="fr-FR" dirty="0">
+            <a:pPr marL="0" indent="0">
+              <a:lnSpc>
+                <a:spcPct val="100000"/>
+              </a:lnSpc>
+              <a:buNone/>
+            </a:pPr>
+            <a:r>
+              <a:rPr lang="fr-FR" sz="2400" dirty="0">
                 <a:solidFill>
                   <a:schemeClr val="tx1">
-                    <a:lumMod val="85000"/>
-                    <a:lumOff val="15000"/>
+                    <a:lumMod val="65000"/>
+                    <a:lumOff val="35000"/>
                   </a:schemeClr>
                 </a:solidFill>
-                <a:latin typeface="SF Pro Display" panose="00000500000000000000" pitchFamily="2" charset="0"/>
-                <a:ea typeface="SF Pro Display" panose="00000500000000000000" pitchFamily="2" charset="0"/>
+                <a:latin typeface="SF Pro Text" panose="00000500000000000000" pitchFamily="2" charset="0"/>
+                <a:ea typeface="SF Pro Text" panose="00000500000000000000" pitchFamily="2" charset="0"/>
               </a:rPr>
-              <a:t>Conclusion</a:t>
-            </a:r>
-            <a:endParaRPr lang="en-GB" dirty="0">
+              <a:t>Pour chaque modèle nous avons effectué des phases d’entrainement et de comparaison.</a:t>
+            </a:r>
+          </a:p>
+          <a:p>
+            <a:pPr>
+              <a:lnSpc>
+                <a:spcPct val="100000"/>
+              </a:lnSpc>
+            </a:pPr>
+            <a:r>
+              <a:rPr lang="fr-FR" sz="2400" dirty="0">
+                <a:solidFill>
+                  <a:schemeClr val="accent2"/>
+                </a:solidFill>
+                <a:latin typeface="SF Pro Text" panose="00000500000000000000" pitchFamily="2" charset="0"/>
+                <a:ea typeface="SF Pro Text" panose="00000500000000000000" pitchFamily="2" charset="0"/>
+              </a:rPr>
+              <a:t>Phase d’entrainement</a:t>
+            </a:r>
+            <a:r>
+              <a:rPr lang="fr-FR" sz="2400" dirty="0">
+                <a:solidFill>
+                  <a:schemeClr val="tx1">
+                    <a:lumMod val="65000"/>
+                    <a:lumOff val="35000"/>
+                  </a:schemeClr>
+                </a:solidFill>
+                <a:latin typeface="SF Pro Text" panose="00000500000000000000" pitchFamily="2" charset="0"/>
+                <a:ea typeface="SF Pro Text" panose="00000500000000000000" pitchFamily="2" charset="0"/>
+              </a:rPr>
+              <a:t> :</a:t>
+            </a:r>
+          </a:p>
+          <a:p>
+            <a:pPr marL="0" indent="0">
+              <a:lnSpc>
+                <a:spcPct val="100000"/>
+              </a:lnSpc>
+              <a:buNone/>
+            </a:pPr>
+            <a:r>
+              <a:rPr lang="fr-FR" sz="2400" dirty="0">
+                <a:solidFill>
+                  <a:schemeClr val="tx1">
+                    <a:lumMod val="65000"/>
+                    <a:lumOff val="35000"/>
+                  </a:schemeClr>
+                </a:solidFill>
+                <a:latin typeface="SF Pro Text" panose="00000500000000000000" pitchFamily="2" charset="0"/>
+                <a:ea typeface="SF Pro Text" panose="00000500000000000000" pitchFamily="2" charset="0"/>
+              </a:rPr>
+              <a:t>Tout d’abord, nous récupérons le score de précision d’un modèle avec les paramètres par défaut pour avoir un avis préliminaire de son efficacité sur l’ensemble des données.</a:t>
+            </a:r>
+          </a:p>
+          <a:p>
+            <a:pPr marL="0" indent="0">
+              <a:lnSpc>
+                <a:spcPct val="100000"/>
+              </a:lnSpc>
+              <a:buNone/>
+            </a:pPr>
+            <a:r>
+              <a:rPr lang="fr-FR" sz="2400" dirty="0">
+                <a:solidFill>
+                  <a:schemeClr val="tx1">
+                    <a:lumMod val="65000"/>
+                    <a:lumOff val="35000"/>
+                  </a:schemeClr>
+                </a:solidFill>
+                <a:latin typeface="SF Pro Text" panose="00000500000000000000" pitchFamily="2" charset="0"/>
+                <a:ea typeface="SF Pro Text" panose="00000500000000000000" pitchFamily="2" charset="0"/>
+              </a:rPr>
+              <a:t>Ensuite, nous effectuons une étape de recherche pour trouver les meilleurs paramètres applicable au modèle.</a:t>
+            </a:r>
+          </a:p>
+          <a:p>
+            <a:pPr marL="0" indent="0">
+              <a:lnSpc>
+                <a:spcPct val="100000"/>
+              </a:lnSpc>
+              <a:buNone/>
+            </a:pPr>
+            <a:r>
+              <a:rPr lang="fr-FR" sz="2400" dirty="0">
+                <a:solidFill>
+                  <a:schemeClr val="tx1">
+                    <a:lumMod val="65000"/>
+                    <a:lumOff val="35000"/>
+                  </a:schemeClr>
+                </a:solidFill>
+                <a:latin typeface="SF Pro Text" panose="00000500000000000000" pitchFamily="2" charset="0"/>
+                <a:ea typeface="SF Pro Text" panose="00000500000000000000" pitchFamily="2" charset="0"/>
+              </a:rPr>
+              <a:t>Enfin, nous comparons le score de précision du modèle avec les paramètres par défaut et avec les nouveaux paramètres pour voir son potentiel.</a:t>
+            </a:r>
+          </a:p>
+          <a:p>
+            <a:pPr marL="0" indent="0">
+              <a:lnSpc>
+                <a:spcPct val="100000"/>
+              </a:lnSpc>
+              <a:buNone/>
+            </a:pPr>
+            <a:endParaRPr lang="fr-FR" sz="2400" dirty="0">
               <a:solidFill>
                 <a:schemeClr val="tx1">
-                  <a:lumMod val="85000"/>
-                  <a:lumOff val="15000"/>
+                  <a:lumMod val="65000"/>
+                  <a:lumOff val="35000"/>
                 </a:schemeClr>
               </a:solidFill>
-              <a:latin typeface="SF Pro Display" panose="00000500000000000000" pitchFamily="2" charset="0"/>
-              <a:ea typeface="SF Pro Display" panose="00000500000000000000" pitchFamily="2" charset="0"/>
+              <a:latin typeface="SF Pro Text" panose="00000500000000000000" pitchFamily="2" charset="0"/>
+              <a:ea typeface="SF Pro Text" panose="00000500000000000000" pitchFamily="2" charset="0"/>
             </a:endParaRPr>
           </a:p>
         </p:txBody>
@@ -9121,7 +11353,7 @@
     </p:spTree>
     <p:extLst>
       <p:ext uri="{BB962C8B-B14F-4D97-AF65-F5344CB8AC3E}">
-        <p14:creationId xmlns:p14="http://schemas.microsoft.com/office/powerpoint/2010/main" val="266711775"/>
+        <p14:creationId xmlns:p14="http://schemas.microsoft.com/office/powerpoint/2010/main" val="346659254"/>
       </p:ext>
     </p:extLst>
   </p:cSld>

</xml_diff>